<commit_message>
main class diagram updated
</commit_message>
<xml_diff>
--- a/doc/Diagrams.pptx
+++ b/doc/Diagrams.pptx
@@ -106,6 +106,22 @@
       </a:defRPr>
     </a:lvl9pPr>
   </p:defaultTextStyle>
+  <p:extLst>
+    <p:ext uri="{EFAFB233-063F-42B5-8137-9DF3F51BA10A}">
+      <p15:sldGuideLst xmlns:p15="http://schemas.microsoft.com/office/powerpoint/2012/main">
+        <p15:guide id="1" orient="horz" pos="2160">
+          <p15:clr>
+            <a:srgbClr val="A4A3A4"/>
+          </p15:clr>
+        </p15:guide>
+        <p15:guide id="2" pos="2880">
+          <p15:clr>
+            <a:srgbClr val="A4A3A4"/>
+          </p15:clr>
+        </p15:guide>
+      </p15:sldGuideLst>
+    </p:ext>
+  </p:extLst>
 </p:presentation>
 </file>
 
@@ -147,10 +163,9 @@
           <a:lstStyle/>
           <a:p>
             <a:r>
-              <a:rPr lang="en-US" smtClean="0"/>
+              <a:rPr lang="en-US"/>
               <a:t>Click to edit Master title style</a:t>
             </a:r>
-            <a:endParaRPr lang="en-US"/>
           </a:p>
         </p:txBody>
       </p:sp>
@@ -266,10 +281,9 @@
           </a:lstStyle>
           <a:p>
             <a:r>
-              <a:rPr lang="en-US" smtClean="0"/>
+              <a:rPr lang="en-US"/>
               <a:t>Click to edit Master subtitle style</a:t>
             </a:r>
-            <a:endParaRPr lang="en-US"/>
           </a:p>
         </p:txBody>
       </p:sp>
@@ -290,7 +304,7 @@
           <a:p>
             <a:fld id="{78C97017-6FC3-485B-9764-EAC9E56C1D49}" type="datetimeFigureOut">
               <a:rPr lang="en-US" smtClean="0"/>
-              <a:t>8/28/2016</a:t>
+              <a:t>9/6/2016</a:t>
             </a:fld>
             <a:endParaRPr lang="en-US"/>
           </a:p>
@@ -384,10 +398,9 @@
           <a:lstStyle/>
           <a:p>
             <a:r>
-              <a:rPr lang="en-US" smtClean="0"/>
+              <a:rPr lang="en-US"/>
               <a:t>Click to edit Master title style</a:t>
             </a:r>
-            <a:endParaRPr lang="en-US"/>
           </a:p>
         </p:txBody>
       </p:sp>
@@ -408,38 +421,37 @@
           <a:p>
             <a:pPr lvl="0"/>
             <a:r>
-              <a:rPr lang="en-US" smtClean="0"/>
+              <a:rPr lang="en-US"/>
               <a:t>Click to edit Master text styles</a:t>
             </a:r>
           </a:p>
           <a:p>
             <a:pPr lvl="1"/>
             <a:r>
-              <a:rPr lang="en-US" smtClean="0"/>
+              <a:rPr lang="en-US"/>
               <a:t>Second level</a:t>
             </a:r>
           </a:p>
           <a:p>
             <a:pPr lvl="2"/>
             <a:r>
-              <a:rPr lang="en-US" smtClean="0"/>
+              <a:rPr lang="en-US"/>
               <a:t>Third level</a:t>
             </a:r>
           </a:p>
           <a:p>
             <a:pPr lvl="3"/>
             <a:r>
-              <a:rPr lang="en-US" smtClean="0"/>
+              <a:rPr lang="en-US"/>
               <a:t>Fourth level</a:t>
             </a:r>
           </a:p>
           <a:p>
             <a:pPr lvl="4"/>
             <a:r>
-              <a:rPr lang="en-US" smtClean="0"/>
+              <a:rPr lang="en-US"/>
               <a:t>Fifth level</a:t>
             </a:r>
-            <a:endParaRPr lang="en-US"/>
           </a:p>
         </p:txBody>
       </p:sp>
@@ -460,7 +472,7 @@
           <a:p>
             <a:fld id="{78C97017-6FC3-485B-9764-EAC9E56C1D49}" type="datetimeFigureOut">
               <a:rPr lang="en-US" smtClean="0"/>
-              <a:t>8/28/2016</a:t>
+              <a:t>9/6/2016</a:t>
             </a:fld>
             <a:endParaRPr lang="en-US"/>
           </a:p>
@@ -559,10 +571,9 @@
           <a:lstStyle/>
           <a:p>
             <a:r>
-              <a:rPr lang="en-US" smtClean="0"/>
+              <a:rPr lang="en-US"/>
               <a:t>Click to edit Master title style</a:t>
             </a:r>
-            <a:endParaRPr lang="en-US"/>
           </a:p>
         </p:txBody>
       </p:sp>
@@ -588,38 +599,37 @@
           <a:p>
             <a:pPr lvl="0"/>
             <a:r>
-              <a:rPr lang="en-US" smtClean="0"/>
+              <a:rPr lang="en-US"/>
               <a:t>Click to edit Master text styles</a:t>
             </a:r>
           </a:p>
           <a:p>
             <a:pPr lvl="1"/>
             <a:r>
-              <a:rPr lang="en-US" smtClean="0"/>
+              <a:rPr lang="en-US"/>
               <a:t>Second level</a:t>
             </a:r>
           </a:p>
           <a:p>
             <a:pPr lvl="2"/>
             <a:r>
-              <a:rPr lang="en-US" smtClean="0"/>
+              <a:rPr lang="en-US"/>
               <a:t>Third level</a:t>
             </a:r>
           </a:p>
           <a:p>
             <a:pPr lvl="3"/>
             <a:r>
-              <a:rPr lang="en-US" smtClean="0"/>
+              <a:rPr lang="en-US"/>
               <a:t>Fourth level</a:t>
             </a:r>
           </a:p>
           <a:p>
             <a:pPr lvl="4"/>
             <a:r>
-              <a:rPr lang="en-US" smtClean="0"/>
+              <a:rPr lang="en-US"/>
               <a:t>Fifth level</a:t>
             </a:r>
-            <a:endParaRPr lang="en-US"/>
           </a:p>
         </p:txBody>
       </p:sp>
@@ -640,7 +650,7 @@
           <a:p>
             <a:fld id="{78C97017-6FC3-485B-9764-EAC9E56C1D49}" type="datetimeFigureOut">
               <a:rPr lang="en-US" smtClean="0"/>
-              <a:t>8/28/2016</a:t>
+              <a:t>9/6/2016</a:t>
             </a:fld>
             <a:endParaRPr lang="en-US"/>
           </a:p>
@@ -734,10 +744,9 @@
           <a:lstStyle/>
           <a:p>
             <a:r>
-              <a:rPr lang="en-US" smtClean="0"/>
+              <a:rPr lang="en-US"/>
               <a:t>Click to edit Master title style</a:t>
             </a:r>
-            <a:endParaRPr lang="en-US"/>
           </a:p>
         </p:txBody>
       </p:sp>
@@ -758,38 +767,37 @@
           <a:p>
             <a:pPr lvl="0"/>
             <a:r>
-              <a:rPr lang="en-US" smtClean="0"/>
+              <a:rPr lang="en-US"/>
               <a:t>Click to edit Master text styles</a:t>
             </a:r>
           </a:p>
           <a:p>
             <a:pPr lvl="1"/>
             <a:r>
-              <a:rPr lang="en-US" smtClean="0"/>
+              <a:rPr lang="en-US"/>
               <a:t>Second level</a:t>
             </a:r>
           </a:p>
           <a:p>
             <a:pPr lvl="2"/>
             <a:r>
-              <a:rPr lang="en-US" smtClean="0"/>
+              <a:rPr lang="en-US"/>
               <a:t>Third level</a:t>
             </a:r>
           </a:p>
           <a:p>
             <a:pPr lvl="3"/>
             <a:r>
-              <a:rPr lang="en-US" smtClean="0"/>
+              <a:rPr lang="en-US"/>
               <a:t>Fourth level</a:t>
             </a:r>
           </a:p>
           <a:p>
             <a:pPr lvl="4"/>
             <a:r>
-              <a:rPr lang="en-US" smtClean="0"/>
+              <a:rPr lang="en-US"/>
               <a:t>Fifth level</a:t>
             </a:r>
-            <a:endParaRPr lang="en-US"/>
           </a:p>
         </p:txBody>
       </p:sp>
@@ -810,7 +818,7 @@
           <a:p>
             <a:fld id="{78C97017-6FC3-485B-9764-EAC9E56C1D49}" type="datetimeFigureOut">
               <a:rPr lang="en-US" smtClean="0"/>
-              <a:t>8/28/2016</a:t>
+              <a:t>9/6/2016</a:t>
             </a:fld>
             <a:endParaRPr lang="en-US"/>
           </a:p>
@@ -913,10 +921,9 @@
           </a:lstStyle>
           <a:p>
             <a:r>
-              <a:rPr lang="en-US" smtClean="0"/>
+              <a:rPr lang="en-US"/>
               <a:t>Click to edit Master title style</a:t>
             </a:r>
-            <a:endParaRPr lang="en-US"/>
           </a:p>
         </p:txBody>
       </p:sp>
@@ -1033,7 +1040,7 @@
           <a:p>
             <a:pPr lvl="0"/>
             <a:r>
-              <a:rPr lang="en-US" smtClean="0"/>
+              <a:rPr lang="en-US"/>
               <a:t>Click to edit Master text styles</a:t>
             </a:r>
           </a:p>
@@ -1056,7 +1063,7 @@
           <a:p>
             <a:fld id="{78C97017-6FC3-485B-9764-EAC9E56C1D49}" type="datetimeFigureOut">
               <a:rPr lang="en-US" smtClean="0"/>
-              <a:t>8/28/2016</a:t>
+              <a:t>9/6/2016</a:t>
             </a:fld>
             <a:endParaRPr lang="en-US"/>
           </a:p>
@@ -1150,10 +1157,9 @@
           <a:lstStyle/>
           <a:p>
             <a:r>
-              <a:rPr lang="en-US" smtClean="0"/>
+              <a:rPr lang="en-US"/>
               <a:t>Click to edit Master title style</a:t>
             </a:r>
-            <a:endParaRPr lang="en-US"/>
           </a:p>
         </p:txBody>
       </p:sp>
@@ -1207,38 +1213,37 @@
           <a:p>
             <a:pPr lvl="0"/>
             <a:r>
-              <a:rPr lang="en-US" smtClean="0"/>
+              <a:rPr lang="en-US"/>
               <a:t>Click to edit Master text styles</a:t>
             </a:r>
           </a:p>
           <a:p>
             <a:pPr lvl="1"/>
             <a:r>
-              <a:rPr lang="en-US" smtClean="0"/>
+              <a:rPr lang="en-US"/>
               <a:t>Second level</a:t>
             </a:r>
           </a:p>
           <a:p>
             <a:pPr lvl="2"/>
             <a:r>
-              <a:rPr lang="en-US" smtClean="0"/>
+              <a:rPr lang="en-US"/>
               <a:t>Third level</a:t>
             </a:r>
           </a:p>
           <a:p>
             <a:pPr lvl="3"/>
             <a:r>
-              <a:rPr lang="en-US" smtClean="0"/>
+              <a:rPr lang="en-US"/>
               <a:t>Fourth level</a:t>
             </a:r>
           </a:p>
           <a:p>
             <a:pPr lvl="4"/>
             <a:r>
-              <a:rPr lang="en-US" smtClean="0"/>
+              <a:rPr lang="en-US"/>
               <a:t>Fifth level</a:t>
             </a:r>
-            <a:endParaRPr lang="en-US"/>
           </a:p>
         </p:txBody>
       </p:sp>
@@ -1292,38 +1297,37 @@
           <a:p>
             <a:pPr lvl="0"/>
             <a:r>
-              <a:rPr lang="en-US" smtClean="0"/>
+              <a:rPr lang="en-US"/>
               <a:t>Click to edit Master text styles</a:t>
             </a:r>
           </a:p>
           <a:p>
             <a:pPr lvl="1"/>
             <a:r>
-              <a:rPr lang="en-US" smtClean="0"/>
+              <a:rPr lang="en-US"/>
               <a:t>Second level</a:t>
             </a:r>
           </a:p>
           <a:p>
             <a:pPr lvl="2"/>
             <a:r>
-              <a:rPr lang="en-US" smtClean="0"/>
+              <a:rPr lang="en-US"/>
               <a:t>Third level</a:t>
             </a:r>
           </a:p>
           <a:p>
             <a:pPr lvl="3"/>
             <a:r>
-              <a:rPr lang="en-US" smtClean="0"/>
+              <a:rPr lang="en-US"/>
               <a:t>Fourth level</a:t>
             </a:r>
           </a:p>
           <a:p>
             <a:pPr lvl="4"/>
             <a:r>
-              <a:rPr lang="en-US" smtClean="0"/>
+              <a:rPr lang="en-US"/>
               <a:t>Fifth level</a:t>
             </a:r>
-            <a:endParaRPr lang="en-US"/>
           </a:p>
         </p:txBody>
       </p:sp>
@@ -1344,7 +1348,7 @@
           <a:p>
             <a:fld id="{78C97017-6FC3-485B-9764-EAC9E56C1D49}" type="datetimeFigureOut">
               <a:rPr lang="en-US" smtClean="0"/>
-              <a:t>8/28/2016</a:t>
+              <a:t>9/6/2016</a:t>
             </a:fld>
             <a:endParaRPr lang="en-US"/>
           </a:p>
@@ -1442,10 +1446,9 @@
           </a:lstStyle>
           <a:p>
             <a:r>
-              <a:rPr lang="en-US" smtClean="0"/>
+              <a:rPr lang="en-US"/>
               <a:t>Click to edit Master title style</a:t>
             </a:r>
-            <a:endParaRPr lang="en-US"/>
           </a:p>
         </p:txBody>
       </p:sp>
@@ -1508,7 +1511,7 @@
           <a:p>
             <a:pPr lvl="0"/>
             <a:r>
-              <a:rPr lang="en-US" smtClean="0"/>
+              <a:rPr lang="en-US"/>
               <a:t>Click to edit Master text styles</a:t>
             </a:r>
           </a:p>
@@ -1564,38 +1567,37 @@
           <a:p>
             <a:pPr lvl="0"/>
             <a:r>
-              <a:rPr lang="en-US" smtClean="0"/>
+              <a:rPr lang="en-US"/>
               <a:t>Click to edit Master text styles</a:t>
             </a:r>
           </a:p>
           <a:p>
             <a:pPr lvl="1"/>
             <a:r>
-              <a:rPr lang="en-US" smtClean="0"/>
+              <a:rPr lang="en-US"/>
               <a:t>Second level</a:t>
             </a:r>
           </a:p>
           <a:p>
             <a:pPr lvl="2"/>
             <a:r>
-              <a:rPr lang="en-US" smtClean="0"/>
+              <a:rPr lang="en-US"/>
               <a:t>Third level</a:t>
             </a:r>
           </a:p>
           <a:p>
             <a:pPr lvl="3"/>
             <a:r>
-              <a:rPr lang="en-US" smtClean="0"/>
+              <a:rPr lang="en-US"/>
               <a:t>Fourth level</a:t>
             </a:r>
           </a:p>
           <a:p>
             <a:pPr lvl="4"/>
             <a:r>
-              <a:rPr lang="en-US" smtClean="0"/>
+              <a:rPr lang="en-US"/>
               <a:t>Fifth level</a:t>
             </a:r>
-            <a:endParaRPr lang="en-US"/>
           </a:p>
         </p:txBody>
       </p:sp>
@@ -1658,7 +1660,7 @@
           <a:p>
             <a:pPr lvl="0"/>
             <a:r>
-              <a:rPr lang="en-US" smtClean="0"/>
+              <a:rPr lang="en-US"/>
               <a:t>Click to edit Master text styles</a:t>
             </a:r>
           </a:p>
@@ -1714,38 +1716,37 @@
           <a:p>
             <a:pPr lvl="0"/>
             <a:r>
-              <a:rPr lang="en-US" smtClean="0"/>
+              <a:rPr lang="en-US"/>
               <a:t>Click to edit Master text styles</a:t>
             </a:r>
           </a:p>
           <a:p>
             <a:pPr lvl="1"/>
             <a:r>
-              <a:rPr lang="en-US" smtClean="0"/>
+              <a:rPr lang="en-US"/>
               <a:t>Second level</a:t>
             </a:r>
           </a:p>
           <a:p>
             <a:pPr lvl="2"/>
             <a:r>
-              <a:rPr lang="en-US" smtClean="0"/>
+              <a:rPr lang="en-US"/>
               <a:t>Third level</a:t>
             </a:r>
           </a:p>
           <a:p>
             <a:pPr lvl="3"/>
             <a:r>
-              <a:rPr lang="en-US" smtClean="0"/>
+              <a:rPr lang="en-US"/>
               <a:t>Fourth level</a:t>
             </a:r>
           </a:p>
           <a:p>
             <a:pPr lvl="4"/>
             <a:r>
-              <a:rPr lang="en-US" smtClean="0"/>
+              <a:rPr lang="en-US"/>
               <a:t>Fifth level</a:t>
             </a:r>
-            <a:endParaRPr lang="en-US"/>
           </a:p>
         </p:txBody>
       </p:sp>
@@ -1766,7 +1767,7 @@
           <a:p>
             <a:fld id="{78C97017-6FC3-485B-9764-EAC9E56C1D49}" type="datetimeFigureOut">
               <a:rPr lang="en-US" smtClean="0"/>
-              <a:t>8/28/2016</a:t>
+              <a:t>9/6/2016</a:t>
             </a:fld>
             <a:endParaRPr lang="en-US"/>
           </a:p>
@@ -1860,10 +1861,9 @@
           <a:lstStyle/>
           <a:p>
             <a:r>
-              <a:rPr lang="en-US" smtClean="0"/>
+              <a:rPr lang="en-US"/>
               <a:t>Click to edit Master title style</a:t>
             </a:r>
-            <a:endParaRPr lang="en-US"/>
           </a:p>
         </p:txBody>
       </p:sp>
@@ -1884,7 +1884,7 @@
           <a:p>
             <a:fld id="{78C97017-6FC3-485B-9764-EAC9E56C1D49}" type="datetimeFigureOut">
               <a:rPr lang="en-US" smtClean="0"/>
-              <a:t>8/28/2016</a:t>
+              <a:t>9/6/2016</a:t>
             </a:fld>
             <a:endParaRPr lang="en-US"/>
           </a:p>
@@ -1979,7 +1979,7 @@
           <a:p>
             <a:fld id="{78C97017-6FC3-485B-9764-EAC9E56C1D49}" type="datetimeFigureOut">
               <a:rPr lang="en-US" smtClean="0"/>
-              <a:t>8/28/2016</a:t>
+              <a:t>9/6/2016</a:t>
             </a:fld>
             <a:endParaRPr lang="en-US"/>
           </a:p>
@@ -2082,10 +2082,9 @@
           </a:lstStyle>
           <a:p>
             <a:r>
-              <a:rPr lang="en-US" smtClean="0"/>
+              <a:rPr lang="en-US"/>
               <a:t>Click to edit Master title style</a:t>
             </a:r>
-            <a:endParaRPr lang="en-US"/>
           </a:p>
         </p:txBody>
       </p:sp>
@@ -2139,38 +2138,37 @@
           <a:p>
             <a:pPr lvl="0"/>
             <a:r>
-              <a:rPr lang="en-US" smtClean="0"/>
+              <a:rPr lang="en-US"/>
               <a:t>Click to edit Master text styles</a:t>
             </a:r>
           </a:p>
           <a:p>
             <a:pPr lvl="1"/>
             <a:r>
-              <a:rPr lang="en-US" smtClean="0"/>
+              <a:rPr lang="en-US"/>
               <a:t>Second level</a:t>
             </a:r>
           </a:p>
           <a:p>
             <a:pPr lvl="2"/>
             <a:r>
-              <a:rPr lang="en-US" smtClean="0"/>
+              <a:rPr lang="en-US"/>
               <a:t>Third level</a:t>
             </a:r>
           </a:p>
           <a:p>
             <a:pPr lvl="3"/>
             <a:r>
-              <a:rPr lang="en-US" smtClean="0"/>
+              <a:rPr lang="en-US"/>
               <a:t>Fourth level</a:t>
             </a:r>
           </a:p>
           <a:p>
             <a:pPr lvl="4"/>
             <a:r>
-              <a:rPr lang="en-US" smtClean="0"/>
+              <a:rPr lang="en-US"/>
               <a:t>Fifth level</a:t>
             </a:r>
-            <a:endParaRPr lang="en-US"/>
           </a:p>
         </p:txBody>
       </p:sp>
@@ -2233,7 +2231,7 @@
           <a:p>
             <a:pPr lvl="0"/>
             <a:r>
-              <a:rPr lang="en-US" smtClean="0"/>
+              <a:rPr lang="en-US"/>
               <a:t>Click to edit Master text styles</a:t>
             </a:r>
           </a:p>
@@ -2256,7 +2254,7 @@
           <a:p>
             <a:fld id="{78C97017-6FC3-485B-9764-EAC9E56C1D49}" type="datetimeFigureOut">
               <a:rPr lang="en-US" smtClean="0"/>
-              <a:t>8/28/2016</a:t>
+              <a:t>9/6/2016</a:t>
             </a:fld>
             <a:endParaRPr lang="en-US"/>
           </a:p>
@@ -2359,10 +2357,9 @@
           </a:lstStyle>
           <a:p>
             <a:r>
-              <a:rPr lang="en-US" smtClean="0"/>
+              <a:rPr lang="en-US"/>
               <a:t>Click to edit Master title style</a:t>
             </a:r>
-            <a:endParaRPr lang="en-US"/>
           </a:p>
         </p:txBody>
       </p:sp>
@@ -2486,7 +2483,7 @@
           <a:p>
             <a:pPr lvl="0"/>
             <a:r>
-              <a:rPr lang="en-US" smtClean="0"/>
+              <a:rPr lang="en-US"/>
               <a:t>Click to edit Master text styles</a:t>
             </a:r>
           </a:p>
@@ -2509,7 +2506,7 @@
           <a:p>
             <a:fld id="{78C97017-6FC3-485B-9764-EAC9E56C1D49}" type="datetimeFigureOut">
               <a:rPr lang="en-US" smtClean="0"/>
-              <a:t>8/28/2016</a:t>
+              <a:t>9/6/2016</a:t>
             </a:fld>
             <a:endParaRPr lang="en-US"/>
           </a:p>
@@ -2618,10 +2615,9 @@
           <a:lstStyle/>
           <a:p>
             <a:r>
-              <a:rPr lang="en-US" smtClean="0"/>
+              <a:rPr lang="en-US"/>
               <a:t>Click to edit Master title style</a:t>
             </a:r>
-            <a:endParaRPr lang="en-US"/>
           </a:p>
         </p:txBody>
       </p:sp>
@@ -2652,38 +2648,37 @@
           <a:p>
             <a:pPr lvl="0"/>
             <a:r>
-              <a:rPr lang="en-US" smtClean="0"/>
+              <a:rPr lang="en-US"/>
               <a:t>Click to edit Master text styles</a:t>
             </a:r>
           </a:p>
           <a:p>
             <a:pPr lvl="1"/>
             <a:r>
-              <a:rPr lang="en-US" smtClean="0"/>
+              <a:rPr lang="en-US"/>
               <a:t>Second level</a:t>
             </a:r>
           </a:p>
           <a:p>
             <a:pPr lvl="2"/>
             <a:r>
-              <a:rPr lang="en-US" smtClean="0"/>
+              <a:rPr lang="en-US"/>
               <a:t>Third level</a:t>
             </a:r>
           </a:p>
           <a:p>
             <a:pPr lvl="3"/>
             <a:r>
-              <a:rPr lang="en-US" smtClean="0"/>
+              <a:rPr lang="en-US"/>
               <a:t>Fourth level</a:t>
             </a:r>
           </a:p>
           <a:p>
             <a:pPr lvl="4"/>
             <a:r>
-              <a:rPr lang="en-US" smtClean="0"/>
+              <a:rPr lang="en-US"/>
               <a:t>Fifth level</a:t>
             </a:r>
-            <a:endParaRPr lang="en-US"/>
           </a:p>
         </p:txBody>
       </p:sp>
@@ -2722,7 +2717,7 @@
           <a:p>
             <a:fld id="{78C97017-6FC3-485B-9764-EAC9E56C1D49}" type="datetimeFigureOut">
               <a:rPr lang="en-US" smtClean="0"/>
-              <a:t>8/28/2016</a:t>
+              <a:t>9/6/2016</a:t>
             </a:fld>
             <a:endParaRPr lang="en-US"/>
           </a:p>
@@ -3113,14 +3108,13 @@
           <a:lstStyle/>
           <a:p>
             <a:r>
-              <a:rPr lang="en-US" dirty="0" err="1" smtClean="0"/>
+              <a:rPr lang="en-US" dirty="0" err="1"/>
               <a:t>AddressBook</a:t>
             </a:r>
             <a:r>
-              <a:rPr lang="en-US" dirty="0" smtClean="0"/>
+              <a:rPr lang="en-US" dirty="0"/>
               <a:t> – Level 2</a:t>
             </a:r>
-            <a:endParaRPr lang="en-US" dirty="0"/>
           </a:p>
         </p:txBody>
       </p:sp>
@@ -3140,10 +3134,9 @@
           <a:lstStyle/>
           <a:p>
             <a:r>
-              <a:rPr lang="en-US" dirty="0" smtClean="0"/>
+              <a:rPr lang="en-US" dirty="0"/>
               <a:t>Diagrams</a:t>
             </a:r>
-            <a:endParaRPr lang="en-US" dirty="0"/>
           </a:p>
         </p:txBody>
       </p:sp>
@@ -3185,7 +3178,7 @@
         </p:nvSpPr>
         <p:spPr>
           <a:xfrm>
-            <a:off x="761999" y="5141640"/>
+            <a:off x="285465" y="4870306"/>
             <a:ext cx="929296" cy="346760"/>
           </a:xfrm>
           <a:prstGeom prst="rect">
@@ -3214,7 +3207,7 @@
           <a:p>
             <a:pPr algn="ctr"/>
             <a:r>
-              <a:rPr lang="en-US" sz="1050" dirty="0" err="1" smtClean="0"/>
+              <a:rPr lang="en-US" sz="1050" dirty="0" err="1"/>
               <a:t>TextUi</a:t>
             </a:r>
             <a:endParaRPr lang="en-SG" sz="1050" dirty="0"/>
@@ -3229,7 +3222,7 @@
         </p:nvSpPr>
         <p:spPr>
           <a:xfrm>
-            <a:off x="762000" y="3747060"/>
+            <a:off x="285466" y="3475726"/>
             <a:ext cx="929296" cy="346760"/>
           </a:xfrm>
           <a:prstGeom prst="rect">
@@ -3265,7 +3258,7 @@
           <a:p>
             <a:pPr algn="ctr"/>
             <a:r>
-              <a:rPr lang="en-US" sz="1050" dirty="0" smtClean="0">
+              <a:rPr lang="en-US" sz="1050" dirty="0">
                 <a:solidFill>
                   <a:schemeClr val="bg1"/>
                 </a:solidFill>
@@ -3288,7 +3281,7 @@
         </p:nvSpPr>
         <p:spPr>
           <a:xfrm>
-            <a:off x="2064848" y="3747060"/>
+            <a:off x="1588314" y="3475726"/>
             <a:ext cx="929296" cy="346760"/>
           </a:xfrm>
           <a:prstGeom prst="rect">
@@ -3332,7 +3325,7 @@
         </p:nvSpPr>
         <p:spPr>
           <a:xfrm>
-            <a:off x="1447800" y="3006040"/>
+            <a:off x="971266" y="2734706"/>
             <a:ext cx="634723" cy="346760"/>
           </a:xfrm>
           <a:prstGeom prst="rect">
@@ -3361,7 +3354,7 @@
           <a:p>
             <a:pPr algn="ctr"/>
             <a:r>
-              <a:rPr lang="en-US" sz="1050" dirty="0" smtClean="0"/>
+              <a:rPr lang="en-US" sz="1050" dirty="0"/>
               <a:t>Parser</a:t>
             </a:r>
             <a:endParaRPr lang="en-SG" sz="1050" dirty="0"/>
@@ -3376,7 +3369,7 @@
         </p:nvSpPr>
         <p:spPr>
           <a:xfrm>
-            <a:off x="3681046" y="3032560"/>
+            <a:off x="3204512" y="2761226"/>
             <a:ext cx="929296" cy="346760"/>
           </a:xfrm>
           <a:prstGeom prst="rect">
@@ -3405,14 +3398,14 @@
           <a:p>
             <a:pPr algn="ctr"/>
             <a:r>
-              <a:rPr lang="en-US" sz="1050" dirty="0" smtClean="0"/>
+              <a:rPr lang="en-US" sz="1050" dirty="0"/>
               <a:t>Unique</a:t>
             </a:r>
             <a:br>
-              <a:rPr lang="en-US" sz="1050" dirty="0" smtClean="0"/>
+              <a:rPr lang="en-US" sz="1050" dirty="0"/>
             </a:br>
             <a:r>
-              <a:rPr lang="en-US" sz="1050" dirty="0" err="1" smtClean="0"/>
+              <a:rPr lang="en-US" sz="1050" dirty="0" err="1"/>
               <a:t>TagList</a:t>
             </a:r>
             <a:endParaRPr lang="en-SG" sz="1050" dirty="0"/>
@@ -3427,7 +3420,7 @@
         </p:nvSpPr>
         <p:spPr>
           <a:xfrm>
-            <a:off x="3654669" y="4352685"/>
+            <a:off x="3178135" y="4081351"/>
             <a:ext cx="929296" cy="346760"/>
           </a:xfrm>
           <a:prstGeom prst="rect">
@@ -3456,14 +3449,14 @@
           <a:p>
             <a:pPr algn="ctr"/>
             <a:r>
-              <a:rPr lang="en-US" sz="1050" dirty="0" smtClean="0"/>
+              <a:rPr lang="en-US" sz="1050" dirty="0"/>
               <a:t>Unique</a:t>
             </a:r>
             <a:br>
-              <a:rPr lang="en-US" sz="1050" dirty="0" smtClean="0"/>
+              <a:rPr lang="en-US" sz="1050" dirty="0"/>
             </a:br>
             <a:r>
-              <a:rPr lang="en-US" sz="1050" dirty="0" err="1" smtClean="0"/>
+              <a:rPr lang="en-US" sz="1050" dirty="0" err="1"/>
               <a:t>PersonList</a:t>
             </a:r>
             <a:endParaRPr lang="en-SG" sz="1050" dirty="0"/>
@@ -3478,7 +3471,7 @@
         </p:nvSpPr>
         <p:spPr>
           <a:xfrm>
-            <a:off x="5219458" y="4352685"/>
+            <a:off x="4742924" y="4081351"/>
             <a:ext cx="929296" cy="346760"/>
           </a:xfrm>
           <a:prstGeom prst="rect">
@@ -3507,140 +3500,8 @@
           <a:p>
             <a:pPr algn="ctr"/>
             <a:r>
-              <a:rPr lang="en-US" sz="1050" dirty="0" smtClean="0"/>
+              <a:rPr lang="en-US" sz="1050" dirty="0"/>
               <a:t>Person</a:t>
-            </a:r>
-            <a:endParaRPr lang="en-SG" sz="1050" dirty="0"/>
-          </a:p>
-        </p:txBody>
-      </p:sp>
-      <p:sp>
-        <p:nvSpPr>
-          <p:cNvPr id="20" name="Rectangle 19"/>
-          <p:cNvSpPr/>
-          <p:nvPr/>
-        </p:nvSpPr>
-        <p:spPr>
-          <a:xfrm>
-            <a:off x="6781800" y="4036277"/>
-            <a:ext cx="929296" cy="346760"/>
-          </a:xfrm>
-          <a:prstGeom prst="rect">
-            <a:avLst/>
-          </a:prstGeom>
-          <a:ln w="19050"/>
-          <a:effectLst/>
-        </p:spPr>
-        <p:style>
-          <a:lnRef idx="1">
-            <a:schemeClr val="accent4"/>
-          </a:lnRef>
-          <a:fillRef idx="2">
-            <a:schemeClr val="accent4"/>
-          </a:fillRef>
-          <a:effectRef idx="1">
-            <a:schemeClr val="accent4"/>
-          </a:effectRef>
-          <a:fontRef idx="minor">
-            <a:schemeClr val="dk1"/>
-          </a:fontRef>
-        </p:style>
-        <p:txBody>
-          <a:bodyPr rtlCol="0" anchor="ctr"/>
-          <a:lstStyle/>
-          <a:p>
-            <a:pPr algn="ctr"/>
-            <a:r>
-              <a:rPr lang="en-US" sz="1050" dirty="0" smtClean="0"/>
-              <a:t>Phone</a:t>
-            </a:r>
-            <a:endParaRPr lang="en-SG" sz="1050" dirty="0"/>
-          </a:p>
-        </p:txBody>
-      </p:sp>
-      <p:sp>
-        <p:nvSpPr>
-          <p:cNvPr id="21" name="Rectangle 20"/>
-          <p:cNvSpPr/>
-          <p:nvPr/>
-        </p:nvSpPr>
-        <p:spPr>
-          <a:xfrm>
-            <a:off x="6796454" y="4495800"/>
-            <a:ext cx="929296" cy="346760"/>
-          </a:xfrm>
-          <a:prstGeom prst="rect">
-            <a:avLst/>
-          </a:prstGeom>
-          <a:ln w="19050"/>
-          <a:effectLst/>
-        </p:spPr>
-        <p:style>
-          <a:lnRef idx="1">
-            <a:schemeClr val="accent4"/>
-          </a:lnRef>
-          <a:fillRef idx="2">
-            <a:schemeClr val="accent4"/>
-          </a:fillRef>
-          <a:effectRef idx="1">
-            <a:schemeClr val="accent4"/>
-          </a:effectRef>
-          <a:fontRef idx="minor">
-            <a:schemeClr val="dk1"/>
-          </a:fontRef>
-        </p:style>
-        <p:txBody>
-          <a:bodyPr rtlCol="0" anchor="ctr"/>
-          <a:lstStyle/>
-          <a:p>
-            <a:pPr algn="ctr"/>
-            <a:r>
-              <a:rPr lang="en-US" sz="1050" dirty="0" smtClean="0"/>
-              <a:t>Email</a:t>
-            </a:r>
-            <a:endParaRPr lang="en-SG" sz="1050" dirty="0"/>
-          </a:p>
-        </p:txBody>
-      </p:sp>
-      <p:sp>
-        <p:nvSpPr>
-          <p:cNvPr id="22" name="Rectangle 21"/>
-          <p:cNvSpPr/>
-          <p:nvPr/>
-        </p:nvSpPr>
-        <p:spPr>
-          <a:xfrm>
-            <a:off x="6796454" y="4953000"/>
-            <a:ext cx="929296" cy="346760"/>
-          </a:xfrm>
-          <a:prstGeom prst="rect">
-            <a:avLst/>
-          </a:prstGeom>
-          <a:ln w="19050"/>
-          <a:effectLst/>
-        </p:spPr>
-        <p:style>
-          <a:lnRef idx="1">
-            <a:schemeClr val="accent4"/>
-          </a:lnRef>
-          <a:fillRef idx="2">
-            <a:schemeClr val="accent4"/>
-          </a:fillRef>
-          <a:effectRef idx="1">
-            <a:schemeClr val="accent4"/>
-          </a:effectRef>
-          <a:fontRef idx="minor">
-            <a:schemeClr val="dk1"/>
-          </a:fontRef>
-        </p:style>
-        <p:txBody>
-          <a:bodyPr rtlCol="0" anchor="ctr"/>
-          <a:lstStyle/>
-          <a:p>
-            <a:pPr algn="ctr"/>
-            <a:r>
-              <a:rPr lang="en-US" sz="1050" dirty="0" smtClean="0"/>
-              <a:t>Address</a:t>
             </a:r>
             <a:endParaRPr lang="en-SG" sz="1050" dirty="0"/>
           </a:p>
@@ -3654,7 +3515,7 @@
         </p:nvSpPr>
         <p:spPr>
           <a:xfrm>
-            <a:off x="1153227" y="4460471"/>
+            <a:off x="676693" y="4189137"/>
             <a:ext cx="929296" cy="346760"/>
           </a:xfrm>
           <a:prstGeom prst="rect">
@@ -3683,7 +3544,7 @@
           <a:p>
             <a:pPr algn="ctr"/>
             <a:r>
-              <a:rPr lang="en-US" sz="1050" dirty="0" err="1" smtClean="0"/>
+              <a:rPr lang="en-US" sz="1050" dirty="0" err="1"/>
               <a:t>StorageFile</a:t>
             </a:r>
             <a:endParaRPr lang="en-SG" sz="1050" dirty="0"/>
@@ -3698,7 +3559,7 @@
         </p:nvCxnSpPr>
         <p:spPr>
           <a:xfrm rot="5400000">
-            <a:off x="321738" y="4617731"/>
+            <a:off x="-154796" y="4346397"/>
             <a:ext cx="1047820" cy="1"/>
           </a:xfrm>
           <a:prstGeom prst="bentConnector3">
@@ -3741,7 +3602,7 @@
         </p:nvCxnSpPr>
         <p:spPr>
           <a:xfrm rot="5400000" flipH="1" flipV="1">
-            <a:off x="1053404" y="3352664"/>
+            <a:off x="576870" y="3081330"/>
             <a:ext cx="567640" cy="221152"/>
           </a:xfrm>
           <a:prstGeom prst="bentConnector2">
@@ -3780,7 +3641,7 @@
         </p:nvCxnSpPr>
         <p:spPr>
           <a:xfrm rot="16200000" flipH="1">
-            <a:off x="809847" y="4297627"/>
+            <a:off x="333313" y="4026293"/>
             <a:ext cx="530702" cy="141745"/>
           </a:xfrm>
           <a:prstGeom prst="bentConnector2">
@@ -3821,7 +3682,7 @@
         </p:nvCxnSpPr>
         <p:spPr>
           <a:xfrm flipV="1">
-            <a:off x="3230192" y="3205940"/>
+            <a:off x="2753658" y="2934606"/>
             <a:ext cx="450854" cy="712546"/>
           </a:xfrm>
           <a:prstGeom prst="bentConnector3">
@@ -3859,7 +3720,7 @@
         </p:nvCxnSpPr>
         <p:spPr>
           <a:xfrm>
-            <a:off x="3230192" y="3918486"/>
+            <a:off x="2753658" y="3647152"/>
             <a:ext cx="424477" cy="607579"/>
           </a:xfrm>
           <a:prstGeom prst="bentConnector3">
@@ -3899,7 +3760,7 @@
         </p:nvCxnSpPr>
         <p:spPr>
           <a:xfrm rot="5400000" flipH="1" flipV="1">
-            <a:off x="5197424" y="3866003"/>
+            <a:off x="4720890" y="3594669"/>
             <a:ext cx="973365" cy="12700"/>
           </a:xfrm>
           <a:prstGeom prst="bentConnector3">
@@ -3933,13 +3794,12 @@
           <p:cNvPr id="65" name="Elbow Connector 64"/>
           <p:cNvCxnSpPr>
             <a:stCxn id="90" idx="3"/>
-            <a:endCxn id="20" idx="1"/>
           </p:cNvCxnSpPr>
           <p:nvPr/>
         </p:nvCxnSpPr>
         <p:spPr>
           <a:xfrm flipV="1">
-            <a:off x="6384802" y="4209657"/>
+            <a:off x="5908268" y="3938323"/>
             <a:ext cx="396998" cy="312434"/>
           </a:xfrm>
           <a:prstGeom prst="bentConnector3">
@@ -3973,13 +3833,12 @@
           <p:cNvPr id="68" name="Elbow Connector 67"/>
           <p:cNvCxnSpPr>
             <a:stCxn id="90" idx="3"/>
-            <a:endCxn id="21" idx="1"/>
           </p:cNvCxnSpPr>
           <p:nvPr/>
         </p:nvCxnSpPr>
         <p:spPr>
           <a:xfrm>
-            <a:off x="6384802" y="4522091"/>
+            <a:off x="5908268" y="4250757"/>
             <a:ext cx="411652" cy="147089"/>
           </a:xfrm>
           <a:prstGeom prst="bentConnector3">
@@ -4013,13 +3872,12 @@
           <p:cNvPr id="71" name="Elbow Connector 70"/>
           <p:cNvCxnSpPr>
             <a:stCxn id="90" idx="3"/>
-            <a:endCxn id="22" idx="1"/>
           </p:cNvCxnSpPr>
           <p:nvPr/>
         </p:nvCxnSpPr>
         <p:spPr>
           <a:xfrm>
-            <a:off x="6384802" y="4522091"/>
+            <a:off x="5908268" y="4250757"/>
             <a:ext cx="411652" cy="604289"/>
           </a:xfrm>
           <a:prstGeom prst="bentConnector3">
@@ -4056,7 +3914,7 @@
         </p:nvSpPr>
         <p:spPr>
           <a:xfrm>
-            <a:off x="5219458" y="3032560"/>
+            <a:off x="4742924" y="2761226"/>
             <a:ext cx="929296" cy="346760"/>
           </a:xfrm>
           <a:prstGeom prst="rect">
@@ -4100,7 +3958,7 @@
         </p:nvSpPr>
         <p:spPr>
           <a:xfrm>
-            <a:off x="6148754" y="4435401"/>
+            <a:off x="5672220" y="4164067"/>
             <a:ext cx="236048" cy="173380"/>
           </a:xfrm>
           <a:prstGeom prst="flowChartDecision">
@@ -4147,7 +4005,7 @@
         </p:nvSpPr>
         <p:spPr>
           <a:xfrm>
-            <a:off x="4610342" y="3131950"/>
+            <a:off x="4133808" y="2860616"/>
             <a:ext cx="236048" cy="173380"/>
           </a:xfrm>
           <a:prstGeom prst="flowChartDecision">
@@ -4188,7 +4046,7 @@
         </p:nvSpPr>
         <p:spPr>
           <a:xfrm>
-            <a:off x="4573941" y="4439375"/>
+            <a:off x="4097407" y="4168041"/>
             <a:ext cx="236048" cy="173380"/>
           </a:xfrm>
           <a:prstGeom prst="flowChartDecision">
@@ -4229,7 +4087,7 @@
         </p:nvSpPr>
         <p:spPr>
           <a:xfrm>
-            <a:off x="2994144" y="3831796"/>
+            <a:off x="2517610" y="3560462"/>
             <a:ext cx="236048" cy="173380"/>
           </a:xfrm>
           <a:prstGeom prst="flowChartDecision">
@@ -4275,7 +4133,7 @@
         </p:nvCxnSpPr>
         <p:spPr>
           <a:xfrm flipV="1">
-            <a:off x="4846390" y="3205940"/>
+            <a:off x="4369856" y="2934606"/>
             <a:ext cx="373068" cy="12700"/>
           </a:xfrm>
           <a:prstGeom prst="straightConnector1">
@@ -4313,7 +4171,7 @@
         </p:nvCxnSpPr>
         <p:spPr>
           <a:xfrm>
-            <a:off x="4809989" y="4526065"/>
+            <a:off x="4333455" y="4254731"/>
             <a:ext cx="409469" cy="0"/>
           </a:xfrm>
           <a:prstGeom prst="straightConnector1">
@@ -4351,7 +4209,7 @@
         </p:nvCxnSpPr>
         <p:spPr>
           <a:xfrm>
-            <a:off x="1691296" y="3920440"/>
+            <a:off x="1214762" y="3649106"/>
             <a:ext cx="373552" cy="0"/>
           </a:xfrm>
           <a:prstGeom prst="straightConnector1">
@@ -4389,7 +4247,7 @@
         </p:nvSpPr>
         <p:spPr>
           <a:xfrm>
-            <a:off x="2258278" y="5140408"/>
+            <a:off x="1781744" y="4869074"/>
             <a:ext cx="1408598" cy="346760"/>
           </a:xfrm>
           <a:prstGeom prst="rect">
@@ -4418,14 +4276,14 @@
           <a:p>
             <a:pPr algn="ctr"/>
             <a:r>
-              <a:rPr lang="en-US" sz="1050" dirty="0" smtClean="0"/>
+              <a:rPr lang="en-US" sz="1050" dirty="0"/>
               <a:t>&lt;&lt;interface&gt;&gt;</a:t>
             </a:r>
           </a:p>
           <a:p>
             <a:pPr algn="ctr"/>
             <a:r>
-              <a:rPr lang="en-US" sz="1050" dirty="0" err="1" smtClean="0"/>
+              <a:rPr lang="en-US" sz="1050" dirty="0" err="1"/>
               <a:t>ReadOnlyPerson</a:t>
             </a:r>
             <a:endParaRPr lang="en-SG" sz="1050" dirty="0"/>
@@ -4443,7 +4301,7 @@
         </p:nvCxnSpPr>
         <p:spPr>
           <a:xfrm flipV="1">
-            <a:off x="1691295" y="5313788"/>
+            <a:off x="1214761" y="5042454"/>
             <a:ext cx="566983" cy="1232"/>
           </a:xfrm>
           <a:prstGeom prst="bentConnector3">
@@ -4484,7 +4342,7 @@
         </p:nvSpPr>
         <p:spPr>
           <a:xfrm rot="16200000">
-            <a:off x="3619386" y="5226026"/>
+            <a:off x="3142852" y="4954692"/>
             <a:ext cx="270504" cy="175523"/>
           </a:xfrm>
           <a:prstGeom prst="triangle">
@@ -4527,7 +4385,7 @@
         </p:nvCxnSpPr>
         <p:spPr>
           <a:xfrm rot="5400000">
-            <a:off x="4456082" y="4085763"/>
+            <a:off x="3979548" y="3814429"/>
             <a:ext cx="614343" cy="1841706"/>
           </a:xfrm>
           <a:prstGeom prst="bentConnector2">
@@ -4563,7 +4421,7 @@
         </p:nvSpPr>
         <p:spPr>
           <a:xfrm>
-            <a:off x="2566828" y="1356188"/>
+            <a:off x="2090294" y="1084854"/>
             <a:ext cx="1611867" cy="444640"/>
           </a:xfrm>
           <a:prstGeom prst="rect">
@@ -4614,7 +4472,7 @@
         </p:nvSpPr>
         <p:spPr>
           <a:xfrm flipH="1">
-            <a:off x="4724400" y="1059080"/>
+            <a:off x="4247866" y="787746"/>
             <a:ext cx="1404109" cy="346760"/>
           </a:xfrm>
           <a:prstGeom prst="rect">
@@ -4658,7 +4516,7 @@
         </p:nvSpPr>
         <p:spPr>
           <a:xfrm flipH="1">
-            <a:off x="4724400" y="1454067"/>
+            <a:off x="4247866" y="1182733"/>
             <a:ext cx="1404109" cy="346760"/>
           </a:xfrm>
           <a:prstGeom prst="rect">
@@ -4702,7 +4560,7 @@
         </p:nvSpPr>
         <p:spPr>
           <a:xfrm flipH="1">
-            <a:off x="4724400" y="1849054"/>
+            <a:off x="4247866" y="1577720"/>
             <a:ext cx="1404109" cy="346760"/>
           </a:xfrm>
           <a:prstGeom prst="rect">
@@ -4746,7 +4604,7 @@
         </p:nvSpPr>
         <p:spPr>
           <a:xfrm rot="16200000">
-            <a:off x="4131203" y="1571491"/>
+            <a:off x="3654669" y="1300157"/>
             <a:ext cx="270504" cy="175523"/>
           </a:xfrm>
           <a:prstGeom prst="triangle">
@@ -4789,7 +4647,7 @@
         </p:nvCxnSpPr>
         <p:spPr>
           <a:xfrm flipV="1">
-            <a:off x="4354217" y="1627447"/>
+            <a:off x="3877683" y="1356113"/>
             <a:ext cx="370183" cy="31806"/>
           </a:xfrm>
           <a:prstGeom prst="bentConnector3">
@@ -4827,7 +4685,7 @@
         </p:nvCxnSpPr>
         <p:spPr>
           <a:xfrm flipV="1">
-            <a:off x="4354217" y="1232460"/>
+            <a:off x="3877683" y="961126"/>
             <a:ext cx="370183" cy="426793"/>
           </a:xfrm>
           <a:prstGeom prst="bentConnector3">
@@ -4865,7 +4723,7 @@
         </p:nvCxnSpPr>
         <p:spPr>
           <a:xfrm>
-            <a:off x="4354217" y="1659253"/>
+            <a:off x="3877683" y="1387919"/>
             <a:ext cx="370183" cy="363181"/>
           </a:xfrm>
           <a:prstGeom prst="bentConnector3">
@@ -4900,7 +4758,7 @@
         </p:nvSpPr>
         <p:spPr>
           <a:xfrm flipH="1">
-            <a:off x="4724400" y="2244040"/>
+            <a:off x="4247866" y="1972706"/>
             <a:ext cx="1404109" cy="346760"/>
           </a:xfrm>
           <a:prstGeom prst="rect">
@@ -4929,7 +4787,7 @@
           <a:p>
             <a:pPr algn="ctr"/>
             <a:r>
-              <a:rPr lang="en-US" sz="1050" dirty="0" smtClean="0"/>
+              <a:rPr lang="en-US" sz="1050" dirty="0"/>
               <a:t>…Command</a:t>
             </a:r>
             <a:endParaRPr lang="en-SG" sz="1050" dirty="0"/>
@@ -4947,7 +4805,7 @@
         </p:nvCxnSpPr>
         <p:spPr>
           <a:xfrm>
-            <a:off x="4354217" y="1659253"/>
+            <a:off x="3877683" y="1387919"/>
             <a:ext cx="370183" cy="758167"/>
           </a:xfrm>
           <a:prstGeom prst="bentConnector3">
@@ -4985,7 +4843,7 @@
         </p:nvCxnSpPr>
         <p:spPr>
           <a:xfrm rot="5400000" flipH="1" flipV="1">
-            <a:off x="1452229" y="1891441"/>
+            <a:off x="975695" y="1620107"/>
             <a:ext cx="1427532" cy="801666"/>
           </a:xfrm>
           <a:prstGeom prst="bentConnector2">
@@ -5021,7 +4879,7 @@
         </p:nvCxnSpPr>
         <p:spPr>
           <a:xfrm rot="5400000" flipH="1" flipV="1">
-            <a:off x="632132" y="1812364"/>
+            <a:off x="155598" y="1541030"/>
             <a:ext cx="2293164" cy="1576229"/>
           </a:xfrm>
           <a:prstGeom prst="bentConnector3">
@@ -5062,7 +4920,7 @@
         </p:nvCxnSpPr>
         <p:spPr>
           <a:xfrm rot="5400000">
-            <a:off x="1795164" y="2790743"/>
+            <a:off x="1318630" y="2519409"/>
             <a:ext cx="1889726" cy="6348"/>
           </a:xfrm>
           <a:prstGeom prst="bentConnector3">
@@ -5103,7 +4961,7 @@
         </p:nvSpPr>
         <p:spPr>
           <a:xfrm flipH="1">
-            <a:off x="1219200" y="720040"/>
+            <a:off x="742666" y="448706"/>
             <a:ext cx="1404109" cy="346760"/>
           </a:xfrm>
           <a:prstGeom prst="rect">
@@ -5150,7 +5008,7 @@
         </p:nvCxnSpPr>
         <p:spPr>
           <a:xfrm rot="16200000" flipV="1">
-            <a:off x="2766652" y="750077"/>
+            <a:off x="2290118" y="478743"/>
             <a:ext cx="462768" cy="749453"/>
           </a:xfrm>
           <a:prstGeom prst="bentConnector2">
@@ -5191,7 +5049,7 @@
         </p:nvCxnSpPr>
         <p:spPr>
           <a:xfrm rot="5400000" flipH="1" flipV="1">
-            <a:off x="-394396" y="2133468"/>
+            <a:off x="-870930" y="1862134"/>
             <a:ext cx="2853643" cy="373549"/>
           </a:xfrm>
           <a:prstGeom prst="bentConnector2">
@@ -5222,62 +5080,17 @@
           </a:fontRef>
         </p:style>
       </p:cxnSp>
-      <p:sp>
-        <p:nvSpPr>
-          <p:cNvPr id="92" name="Rectangle 91"/>
-          <p:cNvSpPr/>
-          <p:nvPr/>
-        </p:nvSpPr>
-        <p:spPr>
-          <a:xfrm>
-            <a:off x="6781800" y="3539440"/>
-            <a:ext cx="929296" cy="346760"/>
-          </a:xfrm>
-          <a:prstGeom prst="rect">
-            <a:avLst/>
-          </a:prstGeom>
-          <a:ln w="19050"/>
-          <a:effectLst/>
-        </p:spPr>
-        <p:style>
-          <a:lnRef idx="1">
-            <a:schemeClr val="accent4"/>
-          </a:lnRef>
-          <a:fillRef idx="2">
-            <a:schemeClr val="accent4"/>
-          </a:fillRef>
-          <a:effectRef idx="1">
-            <a:schemeClr val="accent4"/>
-          </a:effectRef>
-          <a:fontRef idx="minor">
-            <a:schemeClr val="dk1"/>
-          </a:fontRef>
-        </p:style>
-        <p:txBody>
-          <a:bodyPr rtlCol="0" anchor="ctr"/>
-          <a:lstStyle/>
-          <a:p>
-            <a:pPr algn="ctr"/>
-            <a:r>
-              <a:rPr lang="en-US" sz="1050" dirty="0"/>
-              <a:t>Name</a:t>
-            </a:r>
-            <a:endParaRPr lang="en-SG" sz="1050" dirty="0"/>
-          </a:p>
-        </p:txBody>
-      </p:sp>
       <p:cxnSp>
         <p:nvCxnSpPr>
           <p:cNvPr id="93" name="Elbow Connector 92"/>
           <p:cNvCxnSpPr>
             <a:stCxn id="90" idx="3"/>
-            <a:endCxn id="92" idx="1"/>
           </p:cNvCxnSpPr>
           <p:nvPr/>
         </p:nvCxnSpPr>
         <p:spPr>
           <a:xfrm flipV="1">
-            <a:off x="6384802" y="3712820"/>
+            <a:off x="5908268" y="3441486"/>
             <a:ext cx="396998" cy="809271"/>
           </a:xfrm>
           <a:prstGeom prst="bentConnector3">
@@ -5314,7 +5127,7 @@
         </p:nvSpPr>
         <p:spPr>
           <a:xfrm>
-            <a:off x="6384802" y="874142"/>
+            <a:off x="5908268" y="602808"/>
             <a:ext cx="929296" cy="346760"/>
           </a:xfrm>
           <a:prstGeom prst="rect">
@@ -5343,7 +5156,7 @@
           <a:p>
             <a:pPr algn="ctr"/>
             <a:r>
-              <a:rPr lang="en-US" sz="1050" dirty="0" smtClean="0"/>
+              <a:rPr lang="en-US" sz="1050" dirty="0"/>
               <a:t>Messages</a:t>
             </a:r>
             <a:endParaRPr lang="en-SG" sz="1050" dirty="0"/>
@@ -5358,7 +5171,7 @@
         </p:nvSpPr>
         <p:spPr>
           <a:xfrm>
-            <a:off x="7592520" y="874142"/>
+            <a:off x="7115986" y="602808"/>
             <a:ext cx="929296" cy="346760"/>
           </a:xfrm>
           <a:prstGeom prst="rect">
@@ -5387,7 +5200,7 @@
           <a:p>
             <a:pPr algn="ctr"/>
             <a:r>
-              <a:rPr lang="en-US" sz="1050" dirty="0" err="1" smtClean="0"/>
+              <a:rPr lang="en-US" sz="1050" dirty="0" err="1"/>
               <a:t>Utils</a:t>
             </a:r>
             <a:endParaRPr lang="en-SG" sz="1050" dirty="0"/>
@@ -5402,7 +5215,7 @@
         </p:nvSpPr>
         <p:spPr>
           <a:xfrm>
-            <a:off x="3666876" y="3710497"/>
+            <a:off x="3190342" y="3439163"/>
             <a:ext cx="929296" cy="346760"/>
           </a:xfrm>
           <a:prstGeom prst="rect">
@@ -5446,7 +5259,7 @@
         </p:nvSpPr>
         <p:spPr>
           <a:xfrm>
-            <a:off x="2356763" y="4455640"/>
+            <a:off x="1880229" y="4184306"/>
             <a:ext cx="929296" cy="346760"/>
           </a:xfrm>
           <a:prstGeom prst="rect">
@@ -5475,7 +5288,7 @@
           <a:p>
             <a:pPr algn="ctr"/>
             <a:r>
-              <a:rPr lang="en-US" sz="1050" dirty="0" smtClean="0"/>
+              <a:rPr lang="en-US" sz="1050" dirty="0"/>
               <a:t>Adapted…</a:t>
             </a:r>
             <a:endParaRPr lang="en-SG" sz="1050" dirty="0"/>
@@ -5493,7 +5306,7 @@
         </p:nvCxnSpPr>
         <p:spPr>
           <a:xfrm flipV="1">
-            <a:off x="2082523" y="4629020"/>
+            <a:off x="1605989" y="4357686"/>
             <a:ext cx="274240" cy="4831"/>
           </a:xfrm>
           <a:prstGeom prst="bentConnector3">
@@ -5534,7 +5347,7 @@
         </p:nvCxnSpPr>
         <p:spPr>
           <a:xfrm flipV="1">
-            <a:off x="6689603" y="1199445"/>
+            <a:off x="6213069" y="928111"/>
             <a:ext cx="0" cy="304800"/>
           </a:xfrm>
           <a:prstGeom prst="straightConnector1">
@@ -5573,7 +5386,7 @@
         </p:nvCxnSpPr>
         <p:spPr>
           <a:xfrm flipV="1">
-            <a:off x="6842003" y="1199445"/>
+            <a:off x="6365469" y="928111"/>
             <a:ext cx="0" cy="304800"/>
           </a:xfrm>
           <a:prstGeom prst="straightConnector1">
@@ -5612,7 +5425,7 @@
         </p:nvCxnSpPr>
         <p:spPr>
           <a:xfrm flipV="1">
-            <a:off x="6994403" y="1199445"/>
+            <a:off x="6517869" y="928111"/>
             <a:ext cx="0" cy="304800"/>
           </a:xfrm>
           <a:prstGeom prst="straightConnector1">
@@ -5651,7 +5464,7 @@
         </p:nvCxnSpPr>
         <p:spPr>
           <a:xfrm flipV="1">
-            <a:off x="7864446" y="1199445"/>
+            <a:off x="7387912" y="928111"/>
             <a:ext cx="0" cy="304800"/>
           </a:xfrm>
           <a:prstGeom prst="straightConnector1">
@@ -5690,7 +5503,7 @@
         </p:nvCxnSpPr>
         <p:spPr>
           <a:xfrm flipV="1">
-            <a:off x="8016846" y="1199445"/>
+            <a:off x="7540312" y="928111"/>
             <a:ext cx="0" cy="304800"/>
           </a:xfrm>
           <a:prstGeom prst="straightConnector1">
@@ -5729,7 +5542,7 @@
         </p:nvCxnSpPr>
         <p:spPr>
           <a:xfrm flipV="1">
-            <a:off x="8169246" y="1199445"/>
+            <a:off x="7692712" y="928111"/>
             <a:ext cx="0" cy="304800"/>
           </a:xfrm>
           <a:prstGeom prst="straightConnector1">
@@ -5760,6 +5573,505 @@
           </a:fontRef>
         </p:style>
       </p:cxnSp>
+      <p:sp>
+        <p:nvSpPr>
+          <p:cNvPr id="116" name="Rectangle 6"/>
+          <p:cNvSpPr/>
+          <p:nvPr/>
+        </p:nvSpPr>
+        <p:spPr>
+          <a:xfrm>
+            <a:off x="7028079" y="5274670"/>
+            <a:ext cx="1868998" cy="327923"/>
+          </a:xfrm>
+          <a:prstGeom prst="rect">
+            <a:avLst/>
+          </a:prstGeom>
+          <a:ln w="19050"/>
+          <a:effectLst/>
+        </p:spPr>
+        <p:style>
+          <a:lnRef idx="1">
+            <a:schemeClr val="accent4"/>
+          </a:lnRef>
+          <a:fillRef idx="2">
+            <a:schemeClr val="accent4"/>
+          </a:fillRef>
+          <a:effectRef idx="1">
+            <a:schemeClr val="accent4"/>
+          </a:effectRef>
+          <a:fontRef idx="minor">
+            <a:schemeClr val="dk1"/>
+          </a:fontRef>
+        </p:style>
+        <p:txBody>
+          <a:bodyPr rtlCol="0" anchor="ctr"/>
+          <a:lstStyle/>
+          <a:p>
+            <a:pPr algn="ctr"/>
+            <a:r>
+              <a:rPr lang="en-SG" sz="1050" dirty="0"/>
+              <a:t>&lt;&lt;interface&gt;&gt; Printable</a:t>
+            </a:r>
+          </a:p>
+        </p:txBody>
+      </p:sp>
+      <p:sp>
+        <p:nvSpPr>
+          <p:cNvPr id="117" name="Rectangle 19"/>
+          <p:cNvSpPr/>
+          <p:nvPr/>
+        </p:nvSpPr>
+        <p:spPr>
+          <a:xfrm>
+            <a:off x="6324600" y="3747787"/>
+            <a:ext cx="929296" cy="346760"/>
+          </a:xfrm>
+          <a:prstGeom prst="rect">
+            <a:avLst/>
+          </a:prstGeom>
+          <a:ln w="19050"/>
+          <a:effectLst/>
+        </p:spPr>
+        <p:style>
+          <a:lnRef idx="1">
+            <a:schemeClr val="accent4"/>
+          </a:lnRef>
+          <a:fillRef idx="2">
+            <a:schemeClr val="accent4"/>
+          </a:fillRef>
+          <a:effectRef idx="1">
+            <a:schemeClr val="accent4"/>
+          </a:effectRef>
+          <a:fontRef idx="minor">
+            <a:schemeClr val="dk1"/>
+          </a:fontRef>
+        </p:style>
+        <p:txBody>
+          <a:bodyPr rtlCol="0" anchor="ctr"/>
+          <a:lstStyle/>
+          <a:p>
+            <a:pPr algn="ctr"/>
+            <a:r>
+              <a:rPr lang="en-US" sz="1050" dirty="0"/>
+              <a:t>Phone</a:t>
+            </a:r>
+            <a:endParaRPr lang="en-SG" sz="1050" dirty="0"/>
+          </a:p>
+        </p:txBody>
+      </p:sp>
+      <p:sp>
+        <p:nvSpPr>
+          <p:cNvPr id="119" name="Rectangle 20"/>
+          <p:cNvSpPr/>
+          <p:nvPr/>
+        </p:nvSpPr>
+        <p:spPr>
+          <a:xfrm>
+            <a:off x="6324600" y="4142774"/>
+            <a:ext cx="929296" cy="346760"/>
+          </a:xfrm>
+          <a:prstGeom prst="rect">
+            <a:avLst/>
+          </a:prstGeom>
+          <a:ln w="19050"/>
+          <a:effectLst/>
+        </p:spPr>
+        <p:style>
+          <a:lnRef idx="1">
+            <a:schemeClr val="accent4"/>
+          </a:lnRef>
+          <a:fillRef idx="2">
+            <a:schemeClr val="accent4"/>
+          </a:fillRef>
+          <a:effectRef idx="1">
+            <a:schemeClr val="accent4"/>
+          </a:effectRef>
+          <a:fontRef idx="minor">
+            <a:schemeClr val="dk1"/>
+          </a:fontRef>
+        </p:style>
+        <p:txBody>
+          <a:bodyPr rtlCol="0" anchor="ctr"/>
+          <a:lstStyle/>
+          <a:p>
+            <a:pPr algn="ctr"/>
+            <a:r>
+              <a:rPr lang="en-US" sz="1050" dirty="0"/>
+              <a:t>Email</a:t>
+            </a:r>
+            <a:endParaRPr lang="en-SG" sz="1050" dirty="0"/>
+          </a:p>
+        </p:txBody>
+      </p:sp>
+      <p:sp>
+        <p:nvSpPr>
+          <p:cNvPr id="120" name="Rectangle 21"/>
+          <p:cNvSpPr/>
+          <p:nvPr/>
+        </p:nvSpPr>
+        <p:spPr>
+          <a:xfrm>
+            <a:off x="6324600" y="4537760"/>
+            <a:ext cx="929296" cy="346760"/>
+          </a:xfrm>
+          <a:prstGeom prst="rect">
+            <a:avLst/>
+          </a:prstGeom>
+          <a:ln w="19050"/>
+          <a:effectLst/>
+        </p:spPr>
+        <p:style>
+          <a:lnRef idx="1">
+            <a:schemeClr val="accent4"/>
+          </a:lnRef>
+          <a:fillRef idx="2">
+            <a:schemeClr val="accent4"/>
+          </a:fillRef>
+          <a:effectRef idx="1">
+            <a:schemeClr val="accent4"/>
+          </a:effectRef>
+          <a:fontRef idx="minor">
+            <a:schemeClr val="dk1"/>
+          </a:fontRef>
+        </p:style>
+        <p:txBody>
+          <a:bodyPr rtlCol="0" anchor="ctr"/>
+          <a:lstStyle/>
+          <a:p>
+            <a:pPr algn="ctr"/>
+            <a:r>
+              <a:rPr lang="en-US" sz="1050" dirty="0"/>
+              <a:t>Address</a:t>
+            </a:r>
+            <a:endParaRPr lang="en-SG" sz="1050" dirty="0"/>
+          </a:p>
+        </p:txBody>
+      </p:sp>
+      <p:sp>
+        <p:nvSpPr>
+          <p:cNvPr id="121" name="Isosceles Triangle 24"/>
+          <p:cNvSpPr/>
+          <p:nvPr/>
+        </p:nvSpPr>
+        <p:spPr>
+          <a:xfrm rot="10800000">
+            <a:off x="7827326" y="5089944"/>
+            <a:ext cx="270504" cy="175523"/>
+          </a:xfrm>
+          <a:prstGeom prst="triangle">
+            <a:avLst/>
+          </a:prstGeom>
+          <a:ln w="19050"/>
+          <a:effectLst/>
+        </p:spPr>
+        <p:style>
+          <a:lnRef idx="1">
+            <a:schemeClr val="accent4"/>
+          </a:lnRef>
+          <a:fillRef idx="2">
+            <a:schemeClr val="accent4"/>
+          </a:fillRef>
+          <a:effectRef idx="1">
+            <a:schemeClr val="accent4"/>
+          </a:effectRef>
+          <a:fontRef idx="minor">
+            <a:schemeClr val="dk1"/>
+          </a:fontRef>
+        </p:style>
+        <p:txBody>
+          <a:bodyPr rtlCol="0" anchor="ctr"/>
+          <a:lstStyle/>
+          <a:p>
+            <a:pPr algn="ctr"/>
+            <a:endParaRPr lang="en-SG" sz="1050"/>
+          </a:p>
+        </p:txBody>
+      </p:sp>
+      <p:cxnSp>
+        <p:nvCxnSpPr>
+          <p:cNvPr id="122" name="Elbow Connector 25"/>
+          <p:cNvCxnSpPr>
+            <a:stCxn id="121" idx="3"/>
+            <a:endCxn id="119" idx="3"/>
+          </p:cNvCxnSpPr>
+          <p:nvPr/>
+        </p:nvCxnSpPr>
+        <p:spPr>
+          <a:xfrm rot="16200000" flipV="1">
+            <a:off x="7221342" y="4348708"/>
+            <a:ext cx="773790" cy="708682"/>
+          </a:xfrm>
+          <a:prstGeom prst="bentConnector2">
+            <a:avLst/>
+          </a:prstGeom>
+          <a:ln w="19050">
+            <a:prstDash val="dash"/>
+          </a:ln>
+          <a:effectLst/>
+        </p:spPr>
+        <p:style>
+          <a:lnRef idx="1">
+            <a:schemeClr val="accent4"/>
+          </a:lnRef>
+          <a:fillRef idx="2">
+            <a:schemeClr val="accent4"/>
+          </a:fillRef>
+          <a:effectRef idx="1">
+            <a:schemeClr val="accent4"/>
+          </a:effectRef>
+          <a:fontRef idx="minor">
+            <a:schemeClr val="dk1"/>
+          </a:fontRef>
+        </p:style>
+      </p:cxnSp>
+      <p:cxnSp>
+        <p:nvCxnSpPr>
+          <p:cNvPr id="123" name="Elbow Connector 26"/>
+          <p:cNvCxnSpPr>
+            <a:stCxn id="121" idx="3"/>
+            <a:endCxn id="117" idx="3"/>
+          </p:cNvCxnSpPr>
+          <p:nvPr/>
+        </p:nvCxnSpPr>
+        <p:spPr>
+          <a:xfrm rot="16200000" flipV="1">
+            <a:off x="7023849" y="4151215"/>
+            <a:ext cx="1168777" cy="708682"/>
+          </a:xfrm>
+          <a:prstGeom prst="bentConnector2">
+            <a:avLst/>
+          </a:prstGeom>
+          <a:ln w="19050">
+            <a:prstDash val="dash"/>
+          </a:ln>
+          <a:effectLst/>
+        </p:spPr>
+        <p:style>
+          <a:lnRef idx="1">
+            <a:schemeClr val="accent4"/>
+          </a:lnRef>
+          <a:fillRef idx="2">
+            <a:schemeClr val="accent4"/>
+          </a:fillRef>
+          <a:effectRef idx="1">
+            <a:schemeClr val="accent4"/>
+          </a:effectRef>
+          <a:fontRef idx="minor">
+            <a:schemeClr val="dk1"/>
+          </a:fontRef>
+        </p:style>
+      </p:cxnSp>
+      <p:cxnSp>
+        <p:nvCxnSpPr>
+          <p:cNvPr id="124" name="Elbow Connector 29"/>
+          <p:cNvCxnSpPr>
+            <a:stCxn id="121" idx="3"/>
+            <a:endCxn id="120" idx="3"/>
+          </p:cNvCxnSpPr>
+          <p:nvPr/>
+        </p:nvCxnSpPr>
+        <p:spPr>
+          <a:xfrm rot="16200000" flipV="1">
+            <a:off x="7418835" y="4546201"/>
+            <a:ext cx="378804" cy="708682"/>
+          </a:xfrm>
+          <a:prstGeom prst="bentConnector2">
+            <a:avLst/>
+          </a:prstGeom>
+          <a:ln w="19050">
+            <a:prstDash val="dash"/>
+          </a:ln>
+          <a:effectLst/>
+        </p:spPr>
+        <p:style>
+          <a:lnRef idx="1">
+            <a:schemeClr val="accent4"/>
+          </a:lnRef>
+          <a:fillRef idx="2">
+            <a:schemeClr val="accent4"/>
+          </a:fillRef>
+          <a:effectRef idx="1">
+            <a:schemeClr val="accent4"/>
+          </a:effectRef>
+          <a:fontRef idx="minor">
+            <a:schemeClr val="dk1"/>
+          </a:fontRef>
+        </p:style>
+      </p:cxnSp>
+      <p:sp>
+        <p:nvSpPr>
+          <p:cNvPr id="125" name="Rectangle 21"/>
+          <p:cNvSpPr/>
+          <p:nvPr/>
+        </p:nvSpPr>
+        <p:spPr>
+          <a:xfrm>
+            <a:off x="6324600" y="3352800"/>
+            <a:ext cx="929296" cy="346760"/>
+          </a:xfrm>
+          <a:prstGeom prst="rect">
+            <a:avLst/>
+          </a:prstGeom>
+          <a:ln w="19050"/>
+          <a:effectLst/>
+        </p:spPr>
+        <p:style>
+          <a:lnRef idx="1">
+            <a:schemeClr val="accent4"/>
+          </a:lnRef>
+          <a:fillRef idx="2">
+            <a:schemeClr val="accent4"/>
+          </a:fillRef>
+          <a:effectRef idx="1">
+            <a:schemeClr val="accent4"/>
+          </a:effectRef>
+          <a:fontRef idx="minor">
+            <a:schemeClr val="dk1"/>
+          </a:fontRef>
+        </p:style>
+        <p:txBody>
+          <a:bodyPr rtlCol="0" anchor="ctr"/>
+          <a:lstStyle/>
+          <a:p>
+            <a:pPr algn="ctr"/>
+            <a:r>
+              <a:rPr lang="en-US" sz="1050" dirty="0"/>
+              <a:t>Name</a:t>
+            </a:r>
+            <a:endParaRPr lang="en-SG" sz="1050" dirty="0"/>
+          </a:p>
+        </p:txBody>
+      </p:sp>
+      <p:cxnSp>
+        <p:nvCxnSpPr>
+          <p:cNvPr id="126" name="Elbow Connector 26"/>
+          <p:cNvCxnSpPr>
+            <a:stCxn id="121" idx="3"/>
+            <a:endCxn id="125" idx="3"/>
+          </p:cNvCxnSpPr>
+          <p:nvPr/>
+        </p:nvCxnSpPr>
+        <p:spPr>
+          <a:xfrm rot="16200000" flipV="1">
+            <a:off x="6826355" y="3953721"/>
+            <a:ext cx="1563764" cy="708682"/>
+          </a:xfrm>
+          <a:prstGeom prst="bentConnector2">
+            <a:avLst/>
+          </a:prstGeom>
+          <a:ln w="19050">
+            <a:prstDash val="dash"/>
+          </a:ln>
+          <a:effectLst/>
+        </p:spPr>
+        <p:style>
+          <a:lnRef idx="1">
+            <a:schemeClr val="accent4"/>
+          </a:lnRef>
+          <a:fillRef idx="2">
+            <a:schemeClr val="accent4"/>
+          </a:fillRef>
+          <a:effectRef idx="1">
+            <a:schemeClr val="accent4"/>
+          </a:effectRef>
+          <a:fontRef idx="minor">
+            <a:schemeClr val="dk1"/>
+          </a:fontRef>
+        </p:style>
+      </p:cxnSp>
+      <p:sp>
+        <p:nvSpPr>
+          <p:cNvPr id="127" name="Rectangle 6"/>
+          <p:cNvSpPr/>
+          <p:nvPr/>
+        </p:nvSpPr>
+        <p:spPr>
+          <a:xfrm>
+            <a:off x="7028079" y="5602495"/>
+            <a:ext cx="1868998" cy="122745"/>
+          </a:xfrm>
+          <a:prstGeom prst="rect">
+            <a:avLst/>
+          </a:prstGeom>
+          <a:ln w="19050"/>
+          <a:effectLst/>
+        </p:spPr>
+        <p:style>
+          <a:lnRef idx="1">
+            <a:schemeClr val="accent4"/>
+          </a:lnRef>
+          <a:fillRef idx="2">
+            <a:schemeClr val="accent4"/>
+          </a:fillRef>
+          <a:effectRef idx="1">
+            <a:schemeClr val="accent4"/>
+          </a:effectRef>
+          <a:fontRef idx="minor">
+            <a:schemeClr val="dk1"/>
+          </a:fontRef>
+        </p:style>
+        <p:txBody>
+          <a:bodyPr rtlCol="0" anchor="ctr"/>
+          <a:lstStyle/>
+          <a:p>
+            <a:pPr algn="ctr"/>
+            <a:endParaRPr lang="en-SG" sz="1050" dirty="0"/>
+          </a:p>
+        </p:txBody>
+      </p:sp>
+      <p:sp>
+        <p:nvSpPr>
+          <p:cNvPr id="128" name="Rectangle 6"/>
+          <p:cNvSpPr/>
+          <p:nvPr/>
+        </p:nvSpPr>
+        <p:spPr>
+          <a:xfrm>
+            <a:off x="7028079" y="5720887"/>
+            <a:ext cx="1868998" cy="271943"/>
+          </a:xfrm>
+          <a:prstGeom prst="rect">
+            <a:avLst/>
+          </a:prstGeom>
+          <a:ln w="19050"/>
+          <a:effectLst/>
+        </p:spPr>
+        <p:style>
+          <a:lnRef idx="1">
+            <a:schemeClr val="accent4"/>
+          </a:lnRef>
+          <a:fillRef idx="2">
+            <a:schemeClr val="accent4"/>
+          </a:fillRef>
+          <a:effectRef idx="1">
+            <a:schemeClr val="accent4"/>
+          </a:effectRef>
+          <a:fontRef idx="minor">
+            <a:schemeClr val="dk1"/>
+          </a:fontRef>
+        </p:style>
+        <p:txBody>
+          <a:bodyPr rtlCol="0" anchor="ctr"/>
+          <a:lstStyle/>
+          <a:p>
+            <a:pPr algn="ctr"/>
+            <a:r>
+              <a:rPr lang="en-US" sz="1050" dirty="0"/>
+              <a:t>+ </a:t>
+            </a:r>
+            <a:r>
+              <a:rPr lang="en-US" sz="1050" dirty="0" err="1"/>
+              <a:t>getPrintableString</a:t>
+            </a:r>
+            <a:r>
+              <a:rPr lang="en-US" sz="1050" dirty="0"/>
+              <a:t>(): String</a:t>
+            </a:r>
+            <a:endParaRPr lang="en-SG" sz="1050" dirty="0"/>
+          </a:p>
+        </p:txBody>
+      </p:sp>
     </p:spTree>
     <p:extLst>
       <p:ext uri="{BB962C8B-B14F-4D97-AF65-F5344CB8AC3E}">
@@ -5827,7 +6139,7 @@
           <a:p>
             <a:pPr algn="ctr"/>
             <a:r>
-              <a:rPr lang="en-US" sz="1050" dirty="0" smtClean="0"/>
+              <a:rPr lang="en-US" sz="1050" dirty="0"/>
               <a:t>Address</a:t>
             </a:r>
             <a:endParaRPr lang="en-SG" sz="1050" dirty="0"/>
@@ -5871,7 +6183,7 @@
           <a:p>
             <a:pPr algn="ctr"/>
             <a:r>
-              <a:rPr lang="en-US" sz="1050" dirty="0" smtClean="0"/>
+              <a:rPr lang="en-US" sz="1050" dirty="0"/>
               <a:t>Unit</a:t>
             </a:r>
             <a:endParaRPr lang="en-SG" sz="1050" dirty="0"/>
@@ -5998,7 +6310,7 @@
           <a:p>
             <a:pPr algn="ctr"/>
             <a:r>
-              <a:rPr lang="en-US" sz="1050" dirty="0" smtClean="0"/>
+              <a:rPr lang="en-US" sz="1050" dirty="0"/>
               <a:t>Postal code</a:t>
             </a:r>
             <a:endParaRPr lang="en-SG" sz="1050" dirty="0"/>
@@ -6042,7 +6354,7 @@
           <a:p>
             <a:pPr algn="ctr"/>
             <a:r>
-              <a:rPr lang="en-US" sz="1050" dirty="0" smtClean="0"/>
+              <a:rPr lang="en-US" sz="1050" dirty="0"/>
               <a:t>Street</a:t>
             </a:r>
             <a:endParaRPr lang="en-SG" sz="1050" dirty="0"/>
@@ -6086,7 +6398,7 @@
           <a:p>
             <a:pPr algn="ctr"/>
             <a:r>
-              <a:rPr lang="en-US" sz="1050" dirty="0" smtClean="0"/>
+              <a:rPr lang="en-US" sz="1050" dirty="0"/>
               <a:t>Block</a:t>
             </a:r>
             <a:endParaRPr lang="en-SG" sz="1050" dirty="0"/>
@@ -6250,10 +6562,9 @@
           <a:p>
             <a:pPr algn="ctr"/>
             <a:r>
-              <a:rPr lang="en-SG" sz="1050" dirty="0" smtClean="0"/>
+              <a:rPr lang="en-SG" sz="1050" dirty="0"/>
               <a:t>Contact</a:t>
             </a:r>
-            <a:endParaRPr lang="en-SG" sz="1050" dirty="0"/>
           </a:p>
         </p:txBody>
       </p:sp>
@@ -6294,7 +6605,7 @@
           <a:p>
             <a:pPr algn="ctr"/>
             <a:r>
-              <a:rPr lang="en-US" sz="1050" dirty="0" smtClean="0"/>
+              <a:rPr lang="en-US" sz="1050" dirty="0"/>
               <a:t>Phone</a:t>
             </a:r>
             <a:endParaRPr lang="en-SG" sz="1050" dirty="0"/>
@@ -6338,7 +6649,7 @@
           <a:p>
             <a:pPr algn="ctr"/>
             <a:r>
-              <a:rPr lang="en-US" sz="1050" dirty="0" smtClean="0"/>
+              <a:rPr lang="en-US" sz="1050" dirty="0"/>
               <a:t>Email</a:t>
             </a:r>
             <a:endParaRPr lang="en-SG" sz="1050" dirty="0"/>
@@ -6382,7 +6693,7 @@
           <a:p>
             <a:pPr algn="ctr"/>
             <a:r>
-              <a:rPr lang="en-US" sz="1050" dirty="0" smtClean="0"/>
+              <a:rPr lang="en-US" sz="1050" dirty="0"/>
               <a:t>Address</a:t>
             </a:r>
             <a:endParaRPr lang="en-SG" sz="1050" dirty="0"/>
@@ -6571,10 +6882,9 @@
           <a:p>
             <a:pPr algn="ctr"/>
             <a:r>
-              <a:rPr lang="en-SG" sz="1050" dirty="0" smtClean="0"/>
+              <a:rPr lang="en-SG" sz="1050" dirty="0"/>
               <a:t>&lt;&lt;interface&gt;&gt; Printable</a:t>
             </a:r>
-            <a:endParaRPr lang="en-SG" sz="1050" dirty="0"/>
           </a:p>
         </p:txBody>
       </p:sp>
@@ -6615,7 +6925,7 @@
           <a:p>
             <a:pPr algn="ctr"/>
             <a:r>
-              <a:rPr lang="en-US" sz="1050" dirty="0" smtClean="0"/>
+              <a:rPr lang="en-US" sz="1050" dirty="0"/>
               <a:t>Phone</a:t>
             </a:r>
             <a:endParaRPr lang="en-SG" sz="1050" dirty="0"/>
@@ -6659,7 +6969,7 @@
           <a:p>
             <a:pPr algn="ctr"/>
             <a:r>
-              <a:rPr lang="en-US" sz="1050" dirty="0" smtClean="0"/>
+              <a:rPr lang="en-US" sz="1050" dirty="0"/>
               <a:t>Email</a:t>
             </a:r>
             <a:endParaRPr lang="en-SG" sz="1050" dirty="0"/>
@@ -6703,7 +7013,7 @@
           <a:p>
             <a:pPr algn="ctr"/>
             <a:r>
-              <a:rPr lang="en-US" sz="1050" dirty="0" smtClean="0"/>
+              <a:rPr lang="en-US" sz="1050" dirty="0"/>
               <a:t>Address</a:t>
             </a:r>
             <a:endParaRPr lang="en-SG" sz="1050" dirty="0"/>
@@ -6904,7 +7214,7 @@
           <a:p>
             <a:pPr algn="ctr"/>
             <a:r>
-              <a:rPr lang="en-US" sz="1050" dirty="0" smtClean="0"/>
+              <a:rPr lang="en-US" sz="1050" dirty="0"/>
               <a:t>Name</a:t>
             </a:r>
             <a:endParaRPr lang="en-SG" sz="1050" dirty="0"/>
@@ -7027,15 +7337,15 @@
           <a:p>
             <a:pPr algn="ctr"/>
             <a:r>
-              <a:rPr lang="en-US" sz="1050" dirty="0" smtClean="0"/>
+              <a:rPr lang="en-US" sz="1050" dirty="0"/>
               <a:t>+ </a:t>
             </a:r>
             <a:r>
-              <a:rPr lang="en-US" sz="1050" dirty="0" err="1" smtClean="0"/>
+              <a:rPr lang="en-US" sz="1050" dirty="0" err="1"/>
               <a:t>getPrintableString</a:t>
             </a:r>
             <a:r>
-              <a:rPr lang="en-US" sz="1050" dirty="0" smtClean="0"/>
+              <a:rPr lang="en-US" sz="1050" dirty="0"/>
               <a:t>(): String</a:t>
             </a:r>
             <a:endParaRPr lang="en-SG" sz="1050" dirty="0"/>
@@ -7123,14 +7433,14 @@
           <a:p>
             <a:pPr algn="ctr"/>
             <a:r>
-              <a:rPr lang="en-US" sz="1050" dirty="0" smtClean="0"/>
+              <a:rPr lang="en-US" sz="1050" dirty="0"/>
               <a:t>Unique</a:t>
             </a:r>
             <a:br>
-              <a:rPr lang="en-US" sz="1050" dirty="0" smtClean="0"/>
+              <a:rPr lang="en-US" sz="1050" dirty="0"/>
             </a:br>
             <a:r>
-              <a:rPr lang="en-US" sz="1050" dirty="0" err="1" smtClean="0"/>
+              <a:rPr lang="en-US" sz="1050" dirty="0" err="1"/>
               <a:t>TagList</a:t>
             </a:r>
             <a:endParaRPr lang="en-SG" sz="1050" dirty="0"/>
@@ -7174,14 +7484,14 @@
           <a:p>
             <a:pPr algn="ctr"/>
             <a:r>
-              <a:rPr lang="en-US" sz="1050" dirty="0" smtClean="0"/>
+              <a:rPr lang="en-US" sz="1050" dirty="0"/>
               <a:t>Unique</a:t>
             </a:r>
             <a:br>
-              <a:rPr lang="en-US" sz="1050" dirty="0" smtClean="0"/>
+              <a:rPr lang="en-US" sz="1050" dirty="0"/>
             </a:br>
             <a:r>
-              <a:rPr lang="en-US" sz="1050" dirty="0" err="1" smtClean="0"/>
+              <a:rPr lang="en-US" sz="1050" dirty="0" err="1"/>
               <a:t>PersonList</a:t>
             </a:r>
             <a:endParaRPr lang="en-SG" sz="1050" dirty="0"/>
@@ -7225,7 +7535,7 @@
           <a:p>
             <a:pPr algn="ctr"/>
             <a:r>
-              <a:rPr lang="en-US" sz="1050" dirty="0" smtClean="0"/>
+              <a:rPr lang="en-US" sz="1050" dirty="0"/>
               <a:t>Person</a:t>
             </a:r>
             <a:endParaRPr lang="en-SG" sz="1050" dirty="0"/>
@@ -7592,7 +7902,7 @@
           <a:p>
             <a:pPr algn="ctr"/>
             <a:r>
-              <a:rPr lang="en-US" sz="1050" dirty="0" smtClean="0"/>
+              <a:rPr lang="en-US" sz="1050" dirty="0"/>
               <a:t>Tagging</a:t>
             </a:r>
             <a:endParaRPr lang="en-SG" sz="1050" dirty="0"/>
@@ -7736,7 +8046,7 @@
           <a:lstStyle/>
           <a:p>
             <a:r>
-              <a:rPr lang="en-US" dirty="0" smtClean="0">
+              <a:rPr lang="en-US" dirty="0">
                 <a:solidFill>
                   <a:schemeClr val="accent6">
                     <a:lumMod val="75000"/>
@@ -7745,13 +8055,6 @@
               </a:rPr>
               <a:t>*</a:t>
             </a:r>
-            <a:endParaRPr lang="en-US" dirty="0">
-              <a:solidFill>
-                <a:schemeClr val="accent6">
-                  <a:lumMod val="75000"/>
-                </a:schemeClr>
-              </a:solidFill>
-            </a:endParaRPr>
           </a:p>
         </p:txBody>
       </p:sp>

</xml_diff>

<commit_message>
Revert "main class diagram updated"
This reverts commit cc3eb01e6a3da7d85c4793f87336a3d57af9dd94.
</commit_message>
<xml_diff>
--- a/doc/Diagrams.pptx
+++ b/doc/Diagrams.pptx
@@ -106,22 +106,6 @@
       </a:defRPr>
     </a:lvl9pPr>
   </p:defaultTextStyle>
-  <p:extLst>
-    <p:ext uri="{EFAFB233-063F-42B5-8137-9DF3F51BA10A}">
-      <p15:sldGuideLst xmlns:p15="http://schemas.microsoft.com/office/powerpoint/2012/main">
-        <p15:guide id="1" orient="horz" pos="2160">
-          <p15:clr>
-            <a:srgbClr val="A4A3A4"/>
-          </p15:clr>
-        </p15:guide>
-        <p15:guide id="2" pos="2880">
-          <p15:clr>
-            <a:srgbClr val="A4A3A4"/>
-          </p15:clr>
-        </p15:guide>
-      </p15:sldGuideLst>
-    </p:ext>
-  </p:extLst>
 </p:presentation>
 </file>
 
@@ -163,9 +147,10 @@
           <a:lstStyle/>
           <a:p>
             <a:r>
-              <a:rPr lang="en-US"/>
+              <a:rPr lang="en-US" smtClean="0"/>
               <a:t>Click to edit Master title style</a:t>
             </a:r>
+            <a:endParaRPr lang="en-US"/>
           </a:p>
         </p:txBody>
       </p:sp>
@@ -281,9 +266,10 @@
           </a:lstStyle>
           <a:p>
             <a:r>
-              <a:rPr lang="en-US"/>
+              <a:rPr lang="en-US" smtClean="0"/>
               <a:t>Click to edit Master subtitle style</a:t>
             </a:r>
+            <a:endParaRPr lang="en-US"/>
           </a:p>
         </p:txBody>
       </p:sp>
@@ -304,7 +290,7 @@
           <a:p>
             <a:fld id="{78C97017-6FC3-485B-9764-EAC9E56C1D49}" type="datetimeFigureOut">
               <a:rPr lang="en-US" smtClean="0"/>
-              <a:t>9/6/2016</a:t>
+              <a:t>8/28/2016</a:t>
             </a:fld>
             <a:endParaRPr lang="en-US"/>
           </a:p>
@@ -398,9 +384,10 @@
           <a:lstStyle/>
           <a:p>
             <a:r>
-              <a:rPr lang="en-US"/>
+              <a:rPr lang="en-US" smtClean="0"/>
               <a:t>Click to edit Master title style</a:t>
             </a:r>
+            <a:endParaRPr lang="en-US"/>
           </a:p>
         </p:txBody>
       </p:sp>
@@ -421,37 +408,38 @@
           <a:p>
             <a:pPr lvl="0"/>
             <a:r>
-              <a:rPr lang="en-US"/>
+              <a:rPr lang="en-US" smtClean="0"/>
               <a:t>Click to edit Master text styles</a:t>
             </a:r>
           </a:p>
           <a:p>
             <a:pPr lvl="1"/>
             <a:r>
-              <a:rPr lang="en-US"/>
+              <a:rPr lang="en-US" smtClean="0"/>
               <a:t>Second level</a:t>
             </a:r>
           </a:p>
           <a:p>
             <a:pPr lvl="2"/>
             <a:r>
-              <a:rPr lang="en-US"/>
+              <a:rPr lang="en-US" smtClean="0"/>
               <a:t>Third level</a:t>
             </a:r>
           </a:p>
           <a:p>
             <a:pPr lvl="3"/>
             <a:r>
-              <a:rPr lang="en-US"/>
+              <a:rPr lang="en-US" smtClean="0"/>
               <a:t>Fourth level</a:t>
             </a:r>
           </a:p>
           <a:p>
             <a:pPr lvl="4"/>
             <a:r>
-              <a:rPr lang="en-US"/>
+              <a:rPr lang="en-US" smtClean="0"/>
               <a:t>Fifth level</a:t>
             </a:r>
+            <a:endParaRPr lang="en-US"/>
           </a:p>
         </p:txBody>
       </p:sp>
@@ -472,7 +460,7 @@
           <a:p>
             <a:fld id="{78C97017-6FC3-485B-9764-EAC9E56C1D49}" type="datetimeFigureOut">
               <a:rPr lang="en-US" smtClean="0"/>
-              <a:t>9/6/2016</a:t>
+              <a:t>8/28/2016</a:t>
             </a:fld>
             <a:endParaRPr lang="en-US"/>
           </a:p>
@@ -571,9 +559,10 @@
           <a:lstStyle/>
           <a:p>
             <a:r>
-              <a:rPr lang="en-US"/>
+              <a:rPr lang="en-US" smtClean="0"/>
               <a:t>Click to edit Master title style</a:t>
             </a:r>
+            <a:endParaRPr lang="en-US"/>
           </a:p>
         </p:txBody>
       </p:sp>
@@ -599,37 +588,38 @@
           <a:p>
             <a:pPr lvl="0"/>
             <a:r>
-              <a:rPr lang="en-US"/>
+              <a:rPr lang="en-US" smtClean="0"/>
               <a:t>Click to edit Master text styles</a:t>
             </a:r>
           </a:p>
           <a:p>
             <a:pPr lvl="1"/>
             <a:r>
-              <a:rPr lang="en-US"/>
+              <a:rPr lang="en-US" smtClean="0"/>
               <a:t>Second level</a:t>
             </a:r>
           </a:p>
           <a:p>
             <a:pPr lvl="2"/>
             <a:r>
-              <a:rPr lang="en-US"/>
+              <a:rPr lang="en-US" smtClean="0"/>
               <a:t>Third level</a:t>
             </a:r>
           </a:p>
           <a:p>
             <a:pPr lvl="3"/>
             <a:r>
-              <a:rPr lang="en-US"/>
+              <a:rPr lang="en-US" smtClean="0"/>
               <a:t>Fourth level</a:t>
             </a:r>
           </a:p>
           <a:p>
             <a:pPr lvl="4"/>
             <a:r>
-              <a:rPr lang="en-US"/>
+              <a:rPr lang="en-US" smtClean="0"/>
               <a:t>Fifth level</a:t>
             </a:r>
+            <a:endParaRPr lang="en-US"/>
           </a:p>
         </p:txBody>
       </p:sp>
@@ -650,7 +640,7 @@
           <a:p>
             <a:fld id="{78C97017-6FC3-485B-9764-EAC9E56C1D49}" type="datetimeFigureOut">
               <a:rPr lang="en-US" smtClean="0"/>
-              <a:t>9/6/2016</a:t>
+              <a:t>8/28/2016</a:t>
             </a:fld>
             <a:endParaRPr lang="en-US"/>
           </a:p>
@@ -744,9 +734,10 @@
           <a:lstStyle/>
           <a:p>
             <a:r>
-              <a:rPr lang="en-US"/>
+              <a:rPr lang="en-US" smtClean="0"/>
               <a:t>Click to edit Master title style</a:t>
             </a:r>
+            <a:endParaRPr lang="en-US"/>
           </a:p>
         </p:txBody>
       </p:sp>
@@ -767,37 +758,38 @@
           <a:p>
             <a:pPr lvl="0"/>
             <a:r>
-              <a:rPr lang="en-US"/>
+              <a:rPr lang="en-US" smtClean="0"/>
               <a:t>Click to edit Master text styles</a:t>
             </a:r>
           </a:p>
           <a:p>
             <a:pPr lvl="1"/>
             <a:r>
-              <a:rPr lang="en-US"/>
+              <a:rPr lang="en-US" smtClean="0"/>
               <a:t>Second level</a:t>
             </a:r>
           </a:p>
           <a:p>
             <a:pPr lvl="2"/>
             <a:r>
-              <a:rPr lang="en-US"/>
+              <a:rPr lang="en-US" smtClean="0"/>
               <a:t>Third level</a:t>
             </a:r>
           </a:p>
           <a:p>
             <a:pPr lvl="3"/>
             <a:r>
-              <a:rPr lang="en-US"/>
+              <a:rPr lang="en-US" smtClean="0"/>
               <a:t>Fourth level</a:t>
             </a:r>
           </a:p>
           <a:p>
             <a:pPr lvl="4"/>
             <a:r>
-              <a:rPr lang="en-US"/>
+              <a:rPr lang="en-US" smtClean="0"/>
               <a:t>Fifth level</a:t>
             </a:r>
+            <a:endParaRPr lang="en-US"/>
           </a:p>
         </p:txBody>
       </p:sp>
@@ -818,7 +810,7 @@
           <a:p>
             <a:fld id="{78C97017-6FC3-485B-9764-EAC9E56C1D49}" type="datetimeFigureOut">
               <a:rPr lang="en-US" smtClean="0"/>
-              <a:t>9/6/2016</a:t>
+              <a:t>8/28/2016</a:t>
             </a:fld>
             <a:endParaRPr lang="en-US"/>
           </a:p>
@@ -921,9 +913,10 @@
           </a:lstStyle>
           <a:p>
             <a:r>
-              <a:rPr lang="en-US"/>
+              <a:rPr lang="en-US" smtClean="0"/>
               <a:t>Click to edit Master title style</a:t>
             </a:r>
+            <a:endParaRPr lang="en-US"/>
           </a:p>
         </p:txBody>
       </p:sp>
@@ -1040,7 +1033,7 @@
           <a:p>
             <a:pPr lvl="0"/>
             <a:r>
-              <a:rPr lang="en-US"/>
+              <a:rPr lang="en-US" smtClean="0"/>
               <a:t>Click to edit Master text styles</a:t>
             </a:r>
           </a:p>
@@ -1063,7 +1056,7 @@
           <a:p>
             <a:fld id="{78C97017-6FC3-485B-9764-EAC9E56C1D49}" type="datetimeFigureOut">
               <a:rPr lang="en-US" smtClean="0"/>
-              <a:t>9/6/2016</a:t>
+              <a:t>8/28/2016</a:t>
             </a:fld>
             <a:endParaRPr lang="en-US"/>
           </a:p>
@@ -1157,9 +1150,10 @@
           <a:lstStyle/>
           <a:p>
             <a:r>
-              <a:rPr lang="en-US"/>
+              <a:rPr lang="en-US" smtClean="0"/>
               <a:t>Click to edit Master title style</a:t>
             </a:r>
+            <a:endParaRPr lang="en-US"/>
           </a:p>
         </p:txBody>
       </p:sp>
@@ -1213,37 +1207,38 @@
           <a:p>
             <a:pPr lvl="0"/>
             <a:r>
-              <a:rPr lang="en-US"/>
+              <a:rPr lang="en-US" smtClean="0"/>
               <a:t>Click to edit Master text styles</a:t>
             </a:r>
           </a:p>
           <a:p>
             <a:pPr lvl="1"/>
             <a:r>
-              <a:rPr lang="en-US"/>
+              <a:rPr lang="en-US" smtClean="0"/>
               <a:t>Second level</a:t>
             </a:r>
           </a:p>
           <a:p>
             <a:pPr lvl="2"/>
             <a:r>
-              <a:rPr lang="en-US"/>
+              <a:rPr lang="en-US" smtClean="0"/>
               <a:t>Third level</a:t>
             </a:r>
           </a:p>
           <a:p>
             <a:pPr lvl="3"/>
             <a:r>
-              <a:rPr lang="en-US"/>
+              <a:rPr lang="en-US" smtClean="0"/>
               <a:t>Fourth level</a:t>
             </a:r>
           </a:p>
           <a:p>
             <a:pPr lvl="4"/>
             <a:r>
-              <a:rPr lang="en-US"/>
+              <a:rPr lang="en-US" smtClean="0"/>
               <a:t>Fifth level</a:t>
             </a:r>
+            <a:endParaRPr lang="en-US"/>
           </a:p>
         </p:txBody>
       </p:sp>
@@ -1297,37 +1292,38 @@
           <a:p>
             <a:pPr lvl="0"/>
             <a:r>
-              <a:rPr lang="en-US"/>
+              <a:rPr lang="en-US" smtClean="0"/>
               <a:t>Click to edit Master text styles</a:t>
             </a:r>
           </a:p>
           <a:p>
             <a:pPr lvl="1"/>
             <a:r>
-              <a:rPr lang="en-US"/>
+              <a:rPr lang="en-US" smtClean="0"/>
               <a:t>Second level</a:t>
             </a:r>
           </a:p>
           <a:p>
             <a:pPr lvl="2"/>
             <a:r>
-              <a:rPr lang="en-US"/>
+              <a:rPr lang="en-US" smtClean="0"/>
               <a:t>Third level</a:t>
             </a:r>
           </a:p>
           <a:p>
             <a:pPr lvl="3"/>
             <a:r>
-              <a:rPr lang="en-US"/>
+              <a:rPr lang="en-US" smtClean="0"/>
               <a:t>Fourth level</a:t>
             </a:r>
           </a:p>
           <a:p>
             <a:pPr lvl="4"/>
             <a:r>
-              <a:rPr lang="en-US"/>
+              <a:rPr lang="en-US" smtClean="0"/>
               <a:t>Fifth level</a:t>
             </a:r>
+            <a:endParaRPr lang="en-US"/>
           </a:p>
         </p:txBody>
       </p:sp>
@@ -1348,7 +1344,7 @@
           <a:p>
             <a:fld id="{78C97017-6FC3-485B-9764-EAC9E56C1D49}" type="datetimeFigureOut">
               <a:rPr lang="en-US" smtClean="0"/>
-              <a:t>9/6/2016</a:t>
+              <a:t>8/28/2016</a:t>
             </a:fld>
             <a:endParaRPr lang="en-US"/>
           </a:p>
@@ -1446,9 +1442,10 @@
           </a:lstStyle>
           <a:p>
             <a:r>
-              <a:rPr lang="en-US"/>
+              <a:rPr lang="en-US" smtClean="0"/>
               <a:t>Click to edit Master title style</a:t>
             </a:r>
+            <a:endParaRPr lang="en-US"/>
           </a:p>
         </p:txBody>
       </p:sp>
@@ -1511,7 +1508,7 @@
           <a:p>
             <a:pPr lvl="0"/>
             <a:r>
-              <a:rPr lang="en-US"/>
+              <a:rPr lang="en-US" smtClean="0"/>
               <a:t>Click to edit Master text styles</a:t>
             </a:r>
           </a:p>
@@ -1567,37 +1564,38 @@
           <a:p>
             <a:pPr lvl="0"/>
             <a:r>
-              <a:rPr lang="en-US"/>
+              <a:rPr lang="en-US" smtClean="0"/>
               <a:t>Click to edit Master text styles</a:t>
             </a:r>
           </a:p>
           <a:p>
             <a:pPr lvl="1"/>
             <a:r>
-              <a:rPr lang="en-US"/>
+              <a:rPr lang="en-US" smtClean="0"/>
               <a:t>Second level</a:t>
             </a:r>
           </a:p>
           <a:p>
             <a:pPr lvl="2"/>
             <a:r>
-              <a:rPr lang="en-US"/>
+              <a:rPr lang="en-US" smtClean="0"/>
               <a:t>Third level</a:t>
             </a:r>
           </a:p>
           <a:p>
             <a:pPr lvl="3"/>
             <a:r>
-              <a:rPr lang="en-US"/>
+              <a:rPr lang="en-US" smtClean="0"/>
               <a:t>Fourth level</a:t>
             </a:r>
           </a:p>
           <a:p>
             <a:pPr lvl="4"/>
             <a:r>
-              <a:rPr lang="en-US"/>
+              <a:rPr lang="en-US" smtClean="0"/>
               <a:t>Fifth level</a:t>
             </a:r>
+            <a:endParaRPr lang="en-US"/>
           </a:p>
         </p:txBody>
       </p:sp>
@@ -1660,7 +1658,7 @@
           <a:p>
             <a:pPr lvl="0"/>
             <a:r>
-              <a:rPr lang="en-US"/>
+              <a:rPr lang="en-US" smtClean="0"/>
               <a:t>Click to edit Master text styles</a:t>
             </a:r>
           </a:p>
@@ -1716,37 +1714,38 @@
           <a:p>
             <a:pPr lvl="0"/>
             <a:r>
-              <a:rPr lang="en-US"/>
+              <a:rPr lang="en-US" smtClean="0"/>
               <a:t>Click to edit Master text styles</a:t>
             </a:r>
           </a:p>
           <a:p>
             <a:pPr lvl="1"/>
             <a:r>
-              <a:rPr lang="en-US"/>
+              <a:rPr lang="en-US" smtClean="0"/>
               <a:t>Second level</a:t>
             </a:r>
           </a:p>
           <a:p>
             <a:pPr lvl="2"/>
             <a:r>
-              <a:rPr lang="en-US"/>
+              <a:rPr lang="en-US" smtClean="0"/>
               <a:t>Third level</a:t>
             </a:r>
           </a:p>
           <a:p>
             <a:pPr lvl="3"/>
             <a:r>
-              <a:rPr lang="en-US"/>
+              <a:rPr lang="en-US" smtClean="0"/>
               <a:t>Fourth level</a:t>
             </a:r>
           </a:p>
           <a:p>
             <a:pPr lvl="4"/>
             <a:r>
-              <a:rPr lang="en-US"/>
+              <a:rPr lang="en-US" smtClean="0"/>
               <a:t>Fifth level</a:t>
             </a:r>
+            <a:endParaRPr lang="en-US"/>
           </a:p>
         </p:txBody>
       </p:sp>
@@ -1767,7 +1766,7 @@
           <a:p>
             <a:fld id="{78C97017-6FC3-485B-9764-EAC9E56C1D49}" type="datetimeFigureOut">
               <a:rPr lang="en-US" smtClean="0"/>
-              <a:t>9/6/2016</a:t>
+              <a:t>8/28/2016</a:t>
             </a:fld>
             <a:endParaRPr lang="en-US"/>
           </a:p>
@@ -1861,9 +1860,10 @@
           <a:lstStyle/>
           <a:p>
             <a:r>
-              <a:rPr lang="en-US"/>
+              <a:rPr lang="en-US" smtClean="0"/>
               <a:t>Click to edit Master title style</a:t>
             </a:r>
+            <a:endParaRPr lang="en-US"/>
           </a:p>
         </p:txBody>
       </p:sp>
@@ -1884,7 +1884,7 @@
           <a:p>
             <a:fld id="{78C97017-6FC3-485B-9764-EAC9E56C1D49}" type="datetimeFigureOut">
               <a:rPr lang="en-US" smtClean="0"/>
-              <a:t>9/6/2016</a:t>
+              <a:t>8/28/2016</a:t>
             </a:fld>
             <a:endParaRPr lang="en-US"/>
           </a:p>
@@ -1979,7 +1979,7 @@
           <a:p>
             <a:fld id="{78C97017-6FC3-485B-9764-EAC9E56C1D49}" type="datetimeFigureOut">
               <a:rPr lang="en-US" smtClean="0"/>
-              <a:t>9/6/2016</a:t>
+              <a:t>8/28/2016</a:t>
             </a:fld>
             <a:endParaRPr lang="en-US"/>
           </a:p>
@@ -2082,9 +2082,10 @@
           </a:lstStyle>
           <a:p>
             <a:r>
-              <a:rPr lang="en-US"/>
+              <a:rPr lang="en-US" smtClean="0"/>
               <a:t>Click to edit Master title style</a:t>
             </a:r>
+            <a:endParaRPr lang="en-US"/>
           </a:p>
         </p:txBody>
       </p:sp>
@@ -2138,37 +2139,38 @@
           <a:p>
             <a:pPr lvl="0"/>
             <a:r>
-              <a:rPr lang="en-US"/>
+              <a:rPr lang="en-US" smtClean="0"/>
               <a:t>Click to edit Master text styles</a:t>
             </a:r>
           </a:p>
           <a:p>
             <a:pPr lvl="1"/>
             <a:r>
-              <a:rPr lang="en-US"/>
+              <a:rPr lang="en-US" smtClean="0"/>
               <a:t>Second level</a:t>
             </a:r>
           </a:p>
           <a:p>
             <a:pPr lvl="2"/>
             <a:r>
-              <a:rPr lang="en-US"/>
+              <a:rPr lang="en-US" smtClean="0"/>
               <a:t>Third level</a:t>
             </a:r>
           </a:p>
           <a:p>
             <a:pPr lvl="3"/>
             <a:r>
-              <a:rPr lang="en-US"/>
+              <a:rPr lang="en-US" smtClean="0"/>
               <a:t>Fourth level</a:t>
             </a:r>
           </a:p>
           <a:p>
             <a:pPr lvl="4"/>
             <a:r>
-              <a:rPr lang="en-US"/>
+              <a:rPr lang="en-US" smtClean="0"/>
               <a:t>Fifth level</a:t>
             </a:r>
+            <a:endParaRPr lang="en-US"/>
           </a:p>
         </p:txBody>
       </p:sp>
@@ -2231,7 +2233,7 @@
           <a:p>
             <a:pPr lvl="0"/>
             <a:r>
-              <a:rPr lang="en-US"/>
+              <a:rPr lang="en-US" smtClean="0"/>
               <a:t>Click to edit Master text styles</a:t>
             </a:r>
           </a:p>
@@ -2254,7 +2256,7 @@
           <a:p>
             <a:fld id="{78C97017-6FC3-485B-9764-EAC9E56C1D49}" type="datetimeFigureOut">
               <a:rPr lang="en-US" smtClean="0"/>
-              <a:t>9/6/2016</a:t>
+              <a:t>8/28/2016</a:t>
             </a:fld>
             <a:endParaRPr lang="en-US"/>
           </a:p>
@@ -2357,9 +2359,10 @@
           </a:lstStyle>
           <a:p>
             <a:r>
-              <a:rPr lang="en-US"/>
+              <a:rPr lang="en-US" smtClean="0"/>
               <a:t>Click to edit Master title style</a:t>
             </a:r>
+            <a:endParaRPr lang="en-US"/>
           </a:p>
         </p:txBody>
       </p:sp>
@@ -2483,7 +2486,7 @@
           <a:p>
             <a:pPr lvl="0"/>
             <a:r>
-              <a:rPr lang="en-US"/>
+              <a:rPr lang="en-US" smtClean="0"/>
               <a:t>Click to edit Master text styles</a:t>
             </a:r>
           </a:p>
@@ -2506,7 +2509,7 @@
           <a:p>
             <a:fld id="{78C97017-6FC3-485B-9764-EAC9E56C1D49}" type="datetimeFigureOut">
               <a:rPr lang="en-US" smtClean="0"/>
-              <a:t>9/6/2016</a:t>
+              <a:t>8/28/2016</a:t>
             </a:fld>
             <a:endParaRPr lang="en-US"/>
           </a:p>
@@ -2615,9 +2618,10 @@
           <a:lstStyle/>
           <a:p>
             <a:r>
-              <a:rPr lang="en-US"/>
+              <a:rPr lang="en-US" smtClean="0"/>
               <a:t>Click to edit Master title style</a:t>
             </a:r>
+            <a:endParaRPr lang="en-US"/>
           </a:p>
         </p:txBody>
       </p:sp>
@@ -2648,37 +2652,38 @@
           <a:p>
             <a:pPr lvl="0"/>
             <a:r>
-              <a:rPr lang="en-US"/>
+              <a:rPr lang="en-US" smtClean="0"/>
               <a:t>Click to edit Master text styles</a:t>
             </a:r>
           </a:p>
           <a:p>
             <a:pPr lvl="1"/>
             <a:r>
-              <a:rPr lang="en-US"/>
+              <a:rPr lang="en-US" smtClean="0"/>
               <a:t>Second level</a:t>
             </a:r>
           </a:p>
           <a:p>
             <a:pPr lvl="2"/>
             <a:r>
-              <a:rPr lang="en-US"/>
+              <a:rPr lang="en-US" smtClean="0"/>
               <a:t>Third level</a:t>
             </a:r>
           </a:p>
           <a:p>
             <a:pPr lvl="3"/>
             <a:r>
-              <a:rPr lang="en-US"/>
+              <a:rPr lang="en-US" smtClean="0"/>
               <a:t>Fourth level</a:t>
             </a:r>
           </a:p>
           <a:p>
             <a:pPr lvl="4"/>
             <a:r>
-              <a:rPr lang="en-US"/>
+              <a:rPr lang="en-US" smtClean="0"/>
               <a:t>Fifth level</a:t>
             </a:r>
+            <a:endParaRPr lang="en-US"/>
           </a:p>
         </p:txBody>
       </p:sp>
@@ -2717,7 +2722,7 @@
           <a:p>
             <a:fld id="{78C97017-6FC3-485B-9764-EAC9E56C1D49}" type="datetimeFigureOut">
               <a:rPr lang="en-US" smtClean="0"/>
-              <a:t>9/6/2016</a:t>
+              <a:t>8/28/2016</a:t>
             </a:fld>
             <a:endParaRPr lang="en-US"/>
           </a:p>
@@ -3108,13 +3113,14 @@
           <a:lstStyle/>
           <a:p>
             <a:r>
-              <a:rPr lang="en-US" dirty="0" err="1"/>
+              <a:rPr lang="en-US" dirty="0" err="1" smtClean="0"/>
               <a:t>AddressBook</a:t>
             </a:r>
             <a:r>
-              <a:rPr lang="en-US" dirty="0"/>
+              <a:rPr lang="en-US" dirty="0" smtClean="0"/>
               <a:t> – Level 2</a:t>
             </a:r>
+            <a:endParaRPr lang="en-US" dirty="0"/>
           </a:p>
         </p:txBody>
       </p:sp>
@@ -3134,9 +3140,10 @@
           <a:lstStyle/>
           <a:p>
             <a:r>
-              <a:rPr lang="en-US" dirty="0"/>
+              <a:rPr lang="en-US" dirty="0" smtClean="0"/>
               <a:t>Diagrams</a:t>
             </a:r>
+            <a:endParaRPr lang="en-US" dirty="0"/>
           </a:p>
         </p:txBody>
       </p:sp>
@@ -3178,7 +3185,7 @@
         </p:nvSpPr>
         <p:spPr>
           <a:xfrm>
-            <a:off x="285465" y="4870306"/>
+            <a:off x="761999" y="5141640"/>
             <a:ext cx="929296" cy="346760"/>
           </a:xfrm>
           <a:prstGeom prst="rect">
@@ -3207,7 +3214,7 @@
           <a:p>
             <a:pPr algn="ctr"/>
             <a:r>
-              <a:rPr lang="en-US" sz="1050" dirty="0" err="1"/>
+              <a:rPr lang="en-US" sz="1050" dirty="0" err="1" smtClean="0"/>
               <a:t>TextUi</a:t>
             </a:r>
             <a:endParaRPr lang="en-SG" sz="1050" dirty="0"/>
@@ -3222,7 +3229,7 @@
         </p:nvSpPr>
         <p:spPr>
           <a:xfrm>
-            <a:off x="285466" y="3475726"/>
+            <a:off x="762000" y="3747060"/>
             <a:ext cx="929296" cy="346760"/>
           </a:xfrm>
           <a:prstGeom prst="rect">
@@ -3258,7 +3265,7 @@
           <a:p>
             <a:pPr algn="ctr"/>
             <a:r>
-              <a:rPr lang="en-US" sz="1050" dirty="0">
+              <a:rPr lang="en-US" sz="1050" dirty="0" smtClean="0">
                 <a:solidFill>
                   <a:schemeClr val="bg1"/>
                 </a:solidFill>
@@ -3281,7 +3288,7 @@
         </p:nvSpPr>
         <p:spPr>
           <a:xfrm>
-            <a:off x="1588314" y="3475726"/>
+            <a:off x="2064848" y="3747060"/>
             <a:ext cx="929296" cy="346760"/>
           </a:xfrm>
           <a:prstGeom prst="rect">
@@ -3325,7 +3332,7 @@
         </p:nvSpPr>
         <p:spPr>
           <a:xfrm>
-            <a:off x="971266" y="2734706"/>
+            <a:off x="1447800" y="3006040"/>
             <a:ext cx="634723" cy="346760"/>
           </a:xfrm>
           <a:prstGeom prst="rect">
@@ -3354,7 +3361,7 @@
           <a:p>
             <a:pPr algn="ctr"/>
             <a:r>
-              <a:rPr lang="en-US" sz="1050" dirty="0"/>
+              <a:rPr lang="en-US" sz="1050" dirty="0" smtClean="0"/>
               <a:t>Parser</a:t>
             </a:r>
             <a:endParaRPr lang="en-SG" sz="1050" dirty="0"/>
@@ -3369,7 +3376,7 @@
         </p:nvSpPr>
         <p:spPr>
           <a:xfrm>
-            <a:off x="3204512" y="2761226"/>
+            <a:off x="3681046" y="3032560"/>
             <a:ext cx="929296" cy="346760"/>
           </a:xfrm>
           <a:prstGeom prst="rect">
@@ -3398,14 +3405,14 @@
           <a:p>
             <a:pPr algn="ctr"/>
             <a:r>
-              <a:rPr lang="en-US" sz="1050" dirty="0"/>
+              <a:rPr lang="en-US" sz="1050" dirty="0" smtClean="0"/>
               <a:t>Unique</a:t>
             </a:r>
             <a:br>
-              <a:rPr lang="en-US" sz="1050" dirty="0"/>
+              <a:rPr lang="en-US" sz="1050" dirty="0" smtClean="0"/>
             </a:br>
             <a:r>
-              <a:rPr lang="en-US" sz="1050" dirty="0" err="1"/>
+              <a:rPr lang="en-US" sz="1050" dirty="0" err="1" smtClean="0"/>
               <a:t>TagList</a:t>
             </a:r>
             <a:endParaRPr lang="en-SG" sz="1050" dirty="0"/>
@@ -3420,7 +3427,7 @@
         </p:nvSpPr>
         <p:spPr>
           <a:xfrm>
-            <a:off x="3178135" y="4081351"/>
+            <a:off x="3654669" y="4352685"/>
             <a:ext cx="929296" cy="346760"/>
           </a:xfrm>
           <a:prstGeom prst="rect">
@@ -3449,14 +3456,14 @@
           <a:p>
             <a:pPr algn="ctr"/>
             <a:r>
-              <a:rPr lang="en-US" sz="1050" dirty="0"/>
+              <a:rPr lang="en-US" sz="1050" dirty="0" smtClean="0"/>
               <a:t>Unique</a:t>
             </a:r>
             <a:br>
-              <a:rPr lang="en-US" sz="1050" dirty="0"/>
+              <a:rPr lang="en-US" sz="1050" dirty="0" smtClean="0"/>
             </a:br>
             <a:r>
-              <a:rPr lang="en-US" sz="1050" dirty="0" err="1"/>
+              <a:rPr lang="en-US" sz="1050" dirty="0" err="1" smtClean="0"/>
               <a:t>PersonList</a:t>
             </a:r>
             <a:endParaRPr lang="en-SG" sz="1050" dirty="0"/>
@@ -3471,7 +3478,7 @@
         </p:nvSpPr>
         <p:spPr>
           <a:xfrm>
-            <a:off x="4742924" y="4081351"/>
+            <a:off x="5219458" y="4352685"/>
             <a:ext cx="929296" cy="346760"/>
           </a:xfrm>
           <a:prstGeom prst="rect">
@@ -3500,8 +3507,140 @@
           <a:p>
             <a:pPr algn="ctr"/>
             <a:r>
-              <a:rPr lang="en-US" sz="1050" dirty="0"/>
+              <a:rPr lang="en-US" sz="1050" dirty="0" smtClean="0"/>
               <a:t>Person</a:t>
+            </a:r>
+            <a:endParaRPr lang="en-SG" sz="1050" dirty="0"/>
+          </a:p>
+        </p:txBody>
+      </p:sp>
+      <p:sp>
+        <p:nvSpPr>
+          <p:cNvPr id="20" name="Rectangle 19"/>
+          <p:cNvSpPr/>
+          <p:nvPr/>
+        </p:nvSpPr>
+        <p:spPr>
+          <a:xfrm>
+            <a:off x="6781800" y="4036277"/>
+            <a:ext cx="929296" cy="346760"/>
+          </a:xfrm>
+          <a:prstGeom prst="rect">
+            <a:avLst/>
+          </a:prstGeom>
+          <a:ln w="19050"/>
+          <a:effectLst/>
+        </p:spPr>
+        <p:style>
+          <a:lnRef idx="1">
+            <a:schemeClr val="accent4"/>
+          </a:lnRef>
+          <a:fillRef idx="2">
+            <a:schemeClr val="accent4"/>
+          </a:fillRef>
+          <a:effectRef idx="1">
+            <a:schemeClr val="accent4"/>
+          </a:effectRef>
+          <a:fontRef idx="minor">
+            <a:schemeClr val="dk1"/>
+          </a:fontRef>
+        </p:style>
+        <p:txBody>
+          <a:bodyPr rtlCol="0" anchor="ctr"/>
+          <a:lstStyle/>
+          <a:p>
+            <a:pPr algn="ctr"/>
+            <a:r>
+              <a:rPr lang="en-US" sz="1050" dirty="0" smtClean="0"/>
+              <a:t>Phone</a:t>
+            </a:r>
+            <a:endParaRPr lang="en-SG" sz="1050" dirty="0"/>
+          </a:p>
+        </p:txBody>
+      </p:sp>
+      <p:sp>
+        <p:nvSpPr>
+          <p:cNvPr id="21" name="Rectangle 20"/>
+          <p:cNvSpPr/>
+          <p:nvPr/>
+        </p:nvSpPr>
+        <p:spPr>
+          <a:xfrm>
+            <a:off x="6796454" y="4495800"/>
+            <a:ext cx="929296" cy="346760"/>
+          </a:xfrm>
+          <a:prstGeom prst="rect">
+            <a:avLst/>
+          </a:prstGeom>
+          <a:ln w="19050"/>
+          <a:effectLst/>
+        </p:spPr>
+        <p:style>
+          <a:lnRef idx="1">
+            <a:schemeClr val="accent4"/>
+          </a:lnRef>
+          <a:fillRef idx="2">
+            <a:schemeClr val="accent4"/>
+          </a:fillRef>
+          <a:effectRef idx="1">
+            <a:schemeClr val="accent4"/>
+          </a:effectRef>
+          <a:fontRef idx="minor">
+            <a:schemeClr val="dk1"/>
+          </a:fontRef>
+        </p:style>
+        <p:txBody>
+          <a:bodyPr rtlCol="0" anchor="ctr"/>
+          <a:lstStyle/>
+          <a:p>
+            <a:pPr algn="ctr"/>
+            <a:r>
+              <a:rPr lang="en-US" sz="1050" dirty="0" smtClean="0"/>
+              <a:t>Email</a:t>
+            </a:r>
+            <a:endParaRPr lang="en-SG" sz="1050" dirty="0"/>
+          </a:p>
+        </p:txBody>
+      </p:sp>
+      <p:sp>
+        <p:nvSpPr>
+          <p:cNvPr id="22" name="Rectangle 21"/>
+          <p:cNvSpPr/>
+          <p:nvPr/>
+        </p:nvSpPr>
+        <p:spPr>
+          <a:xfrm>
+            <a:off x="6796454" y="4953000"/>
+            <a:ext cx="929296" cy="346760"/>
+          </a:xfrm>
+          <a:prstGeom prst="rect">
+            <a:avLst/>
+          </a:prstGeom>
+          <a:ln w="19050"/>
+          <a:effectLst/>
+        </p:spPr>
+        <p:style>
+          <a:lnRef idx="1">
+            <a:schemeClr val="accent4"/>
+          </a:lnRef>
+          <a:fillRef idx="2">
+            <a:schemeClr val="accent4"/>
+          </a:fillRef>
+          <a:effectRef idx="1">
+            <a:schemeClr val="accent4"/>
+          </a:effectRef>
+          <a:fontRef idx="minor">
+            <a:schemeClr val="dk1"/>
+          </a:fontRef>
+        </p:style>
+        <p:txBody>
+          <a:bodyPr rtlCol="0" anchor="ctr"/>
+          <a:lstStyle/>
+          <a:p>
+            <a:pPr algn="ctr"/>
+            <a:r>
+              <a:rPr lang="en-US" sz="1050" dirty="0" smtClean="0"/>
+              <a:t>Address</a:t>
             </a:r>
             <a:endParaRPr lang="en-SG" sz="1050" dirty="0"/>
           </a:p>
@@ -3515,7 +3654,7 @@
         </p:nvSpPr>
         <p:spPr>
           <a:xfrm>
-            <a:off x="676693" y="4189137"/>
+            <a:off x="1153227" y="4460471"/>
             <a:ext cx="929296" cy="346760"/>
           </a:xfrm>
           <a:prstGeom prst="rect">
@@ -3544,7 +3683,7 @@
           <a:p>
             <a:pPr algn="ctr"/>
             <a:r>
-              <a:rPr lang="en-US" sz="1050" dirty="0" err="1"/>
+              <a:rPr lang="en-US" sz="1050" dirty="0" err="1" smtClean="0"/>
               <a:t>StorageFile</a:t>
             </a:r>
             <a:endParaRPr lang="en-SG" sz="1050" dirty="0"/>
@@ -3559,7 +3698,7 @@
         </p:nvCxnSpPr>
         <p:spPr>
           <a:xfrm rot="5400000">
-            <a:off x="-154796" y="4346397"/>
+            <a:off x="321738" y="4617731"/>
             <a:ext cx="1047820" cy="1"/>
           </a:xfrm>
           <a:prstGeom prst="bentConnector3">
@@ -3602,7 +3741,7 @@
         </p:nvCxnSpPr>
         <p:spPr>
           <a:xfrm rot="5400000" flipH="1" flipV="1">
-            <a:off x="576870" y="3081330"/>
+            <a:off x="1053404" y="3352664"/>
             <a:ext cx="567640" cy="221152"/>
           </a:xfrm>
           <a:prstGeom prst="bentConnector2">
@@ -3641,7 +3780,7 @@
         </p:nvCxnSpPr>
         <p:spPr>
           <a:xfrm rot="16200000" flipH="1">
-            <a:off x="333313" y="4026293"/>
+            <a:off x="809847" y="4297627"/>
             <a:ext cx="530702" cy="141745"/>
           </a:xfrm>
           <a:prstGeom prst="bentConnector2">
@@ -3682,7 +3821,7 @@
         </p:nvCxnSpPr>
         <p:spPr>
           <a:xfrm flipV="1">
-            <a:off x="2753658" y="2934606"/>
+            <a:off x="3230192" y="3205940"/>
             <a:ext cx="450854" cy="712546"/>
           </a:xfrm>
           <a:prstGeom prst="bentConnector3">
@@ -3720,7 +3859,7 @@
         </p:nvCxnSpPr>
         <p:spPr>
           <a:xfrm>
-            <a:off x="2753658" y="3647152"/>
+            <a:off x="3230192" y="3918486"/>
             <a:ext cx="424477" cy="607579"/>
           </a:xfrm>
           <a:prstGeom prst="bentConnector3">
@@ -3760,7 +3899,7 @@
         </p:nvCxnSpPr>
         <p:spPr>
           <a:xfrm rot="5400000" flipH="1" flipV="1">
-            <a:off x="4720890" y="3594669"/>
+            <a:off x="5197424" y="3866003"/>
             <a:ext cx="973365" cy="12700"/>
           </a:xfrm>
           <a:prstGeom prst="bentConnector3">
@@ -3794,12 +3933,13 @@
           <p:cNvPr id="65" name="Elbow Connector 64"/>
           <p:cNvCxnSpPr>
             <a:stCxn id="90" idx="3"/>
+            <a:endCxn id="20" idx="1"/>
           </p:cNvCxnSpPr>
           <p:nvPr/>
         </p:nvCxnSpPr>
         <p:spPr>
           <a:xfrm flipV="1">
-            <a:off x="5908268" y="3938323"/>
+            <a:off x="6384802" y="4209657"/>
             <a:ext cx="396998" cy="312434"/>
           </a:xfrm>
           <a:prstGeom prst="bentConnector3">
@@ -3833,12 +3973,13 @@
           <p:cNvPr id="68" name="Elbow Connector 67"/>
           <p:cNvCxnSpPr>
             <a:stCxn id="90" idx="3"/>
+            <a:endCxn id="21" idx="1"/>
           </p:cNvCxnSpPr>
           <p:nvPr/>
         </p:nvCxnSpPr>
         <p:spPr>
           <a:xfrm>
-            <a:off x="5908268" y="4250757"/>
+            <a:off x="6384802" y="4522091"/>
             <a:ext cx="411652" cy="147089"/>
           </a:xfrm>
           <a:prstGeom prst="bentConnector3">
@@ -3872,12 +4013,13 @@
           <p:cNvPr id="71" name="Elbow Connector 70"/>
           <p:cNvCxnSpPr>
             <a:stCxn id="90" idx="3"/>
+            <a:endCxn id="22" idx="1"/>
           </p:cNvCxnSpPr>
           <p:nvPr/>
         </p:nvCxnSpPr>
         <p:spPr>
           <a:xfrm>
-            <a:off x="5908268" y="4250757"/>
+            <a:off x="6384802" y="4522091"/>
             <a:ext cx="411652" cy="604289"/>
           </a:xfrm>
           <a:prstGeom prst="bentConnector3">
@@ -3914,7 +4056,7 @@
         </p:nvSpPr>
         <p:spPr>
           <a:xfrm>
-            <a:off x="4742924" y="2761226"/>
+            <a:off x="5219458" y="3032560"/>
             <a:ext cx="929296" cy="346760"/>
           </a:xfrm>
           <a:prstGeom prst="rect">
@@ -3958,7 +4100,7 @@
         </p:nvSpPr>
         <p:spPr>
           <a:xfrm>
-            <a:off x="5672220" y="4164067"/>
+            <a:off x="6148754" y="4435401"/>
             <a:ext cx="236048" cy="173380"/>
           </a:xfrm>
           <a:prstGeom prst="flowChartDecision">
@@ -4005,7 +4147,7 @@
         </p:nvSpPr>
         <p:spPr>
           <a:xfrm>
-            <a:off x="4133808" y="2860616"/>
+            <a:off x="4610342" y="3131950"/>
             <a:ext cx="236048" cy="173380"/>
           </a:xfrm>
           <a:prstGeom prst="flowChartDecision">
@@ -4046,7 +4188,7 @@
         </p:nvSpPr>
         <p:spPr>
           <a:xfrm>
-            <a:off x="4097407" y="4168041"/>
+            <a:off x="4573941" y="4439375"/>
             <a:ext cx="236048" cy="173380"/>
           </a:xfrm>
           <a:prstGeom prst="flowChartDecision">
@@ -4087,7 +4229,7 @@
         </p:nvSpPr>
         <p:spPr>
           <a:xfrm>
-            <a:off x="2517610" y="3560462"/>
+            <a:off x="2994144" y="3831796"/>
             <a:ext cx="236048" cy="173380"/>
           </a:xfrm>
           <a:prstGeom prst="flowChartDecision">
@@ -4133,7 +4275,7 @@
         </p:nvCxnSpPr>
         <p:spPr>
           <a:xfrm flipV="1">
-            <a:off x="4369856" y="2934606"/>
+            <a:off x="4846390" y="3205940"/>
             <a:ext cx="373068" cy="12700"/>
           </a:xfrm>
           <a:prstGeom prst="straightConnector1">
@@ -4171,7 +4313,7 @@
         </p:nvCxnSpPr>
         <p:spPr>
           <a:xfrm>
-            <a:off x="4333455" y="4254731"/>
+            <a:off x="4809989" y="4526065"/>
             <a:ext cx="409469" cy="0"/>
           </a:xfrm>
           <a:prstGeom prst="straightConnector1">
@@ -4209,7 +4351,7 @@
         </p:nvCxnSpPr>
         <p:spPr>
           <a:xfrm>
-            <a:off x="1214762" y="3649106"/>
+            <a:off x="1691296" y="3920440"/>
             <a:ext cx="373552" cy="0"/>
           </a:xfrm>
           <a:prstGeom prst="straightConnector1">
@@ -4247,7 +4389,7 @@
         </p:nvSpPr>
         <p:spPr>
           <a:xfrm>
-            <a:off x="1781744" y="4869074"/>
+            <a:off x="2258278" y="5140408"/>
             <a:ext cx="1408598" cy="346760"/>
           </a:xfrm>
           <a:prstGeom prst="rect">
@@ -4276,14 +4418,14 @@
           <a:p>
             <a:pPr algn="ctr"/>
             <a:r>
-              <a:rPr lang="en-US" sz="1050" dirty="0"/>
+              <a:rPr lang="en-US" sz="1050" dirty="0" smtClean="0"/>
               <a:t>&lt;&lt;interface&gt;&gt;</a:t>
             </a:r>
           </a:p>
           <a:p>
             <a:pPr algn="ctr"/>
             <a:r>
-              <a:rPr lang="en-US" sz="1050" dirty="0" err="1"/>
+              <a:rPr lang="en-US" sz="1050" dirty="0" err="1" smtClean="0"/>
               <a:t>ReadOnlyPerson</a:t>
             </a:r>
             <a:endParaRPr lang="en-SG" sz="1050" dirty="0"/>
@@ -4301,7 +4443,7 @@
         </p:nvCxnSpPr>
         <p:spPr>
           <a:xfrm flipV="1">
-            <a:off x="1214761" y="5042454"/>
+            <a:off x="1691295" y="5313788"/>
             <a:ext cx="566983" cy="1232"/>
           </a:xfrm>
           <a:prstGeom prst="bentConnector3">
@@ -4342,7 +4484,7 @@
         </p:nvSpPr>
         <p:spPr>
           <a:xfrm rot="16200000">
-            <a:off x="3142852" y="4954692"/>
+            <a:off x="3619386" y="5226026"/>
             <a:ext cx="270504" cy="175523"/>
           </a:xfrm>
           <a:prstGeom prst="triangle">
@@ -4385,7 +4527,7 @@
         </p:nvCxnSpPr>
         <p:spPr>
           <a:xfrm rot="5400000">
-            <a:off x="3979548" y="3814429"/>
+            <a:off x="4456082" y="4085763"/>
             <a:ext cx="614343" cy="1841706"/>
           </a:xfrm>
           <a:prstGeom prst="bentConnector2">
@@ -4421,7 +4563,7 @@
         </p:nvSpPr>
         <p:spPr>
           <a:xfrm>
-            <a:off x="2090294" y="1084854"/>
+            <a:off x="2566828" y="1356188"/>
             <a:ext cx="1611867" cy="444640"/>
           </a:xfrm>
           <a:prstGeom prst="rect">
@@ -4472,7 +4614,7 @@
         </p:nvSpPr>
         <p:spPr>
           <a:xfrm flipH="1">
-            <a:off x="4247866" y="787746"/>
+            <a:off x="4724400" y="1059080"/>
             <a:ext cx="1404109" cy="346760"/>
           </a:xfrm>
           <a:prstGeom prst="rect">
@@ -4516,7 +4658,7 @@
         </p:nvSpPr>
         <p:spPr>
           <a:xfrm flipH="1">
-            <a:off x="4247866" y="1182733"/>
+            <a:off x="4724400" y="1454067"/>
             <a:ext cx="1404109" cy="346760"/>
           </a:xfrm>
           <a:prstGeom prst="rect">
@@ -4560,7 +4702,7 @@
         </p:nvSpPr>
         <p:spPr>
           <a:xfrm flipH="1">
-            <a:off x="4247866" y="1577720"/>
+            <a:off x="4724400" y="1849054"/>
             <a:ext cx="1404109" cy="346760"/>
           </a:xfrm>
           <a:prstGeom prst="rect">
@@ -4604,7 +4746,7 @@
         </p:nvSpPr>
         <p:spPr>
           <a:xfrm rot="16200000">
-            <a:off x="3654669" y="1300157"/>
+            <a:off x="4131203" y="1571491"/>
             <a:ext cx="270504" cy="175523"/>
           </a:xfrm>
           <a:prstGeom prst="triangle">
@@ -4647,7 +4789,7 @@
         </p:nvCxnSpPr>
         <p:spPr>
           <a:xfrm flipV="1">
-            <a:off x="3877683" y="1356113"/>
+            <a:off x="4354217" y="1627447"/>
             <a:ext cx="370183" cy="31806"/>
           </a:xfrm>
           <a:prstGeom prst="bentConnector3">
@@ -4685,7 +4827,7 @@
         </p:nvCxnSpPr>
         <p:spPr>
           <a:xfrm flipV="1">
-            <a:off x="3877683" y="961126"/>
+            <a:off x="4354217" y="1232460"/>
             <a:ext cx="370183" cy="426793"/>
           </a:xfrm>
           <a:prstGeom prst="bentConnector3">
@@ -4723,7 +4865,7 @@
         </p:nvCxnSpPr>
         <p:spPr>
           <a:xfrm>
-            <a:off x="3877683" y="1387919"/>
+            <a:off x="4354217" y="1659253"/>
             <a:ext cx="370183" cy="363181"/>
           </a:xfrm>
           <a:prstGeom prst="bentConnector3">
@@ -4758,7 +4900,7 @@
         </p:nvSpPr>
         <p:spPr>
           <a:xfrm flipH="1">
-            <a:off x="4247866" y="1972706"/>
+            <a:off x="4724400" y="2244040"/>
             <a:ext cx="1404109" cy="346760"/>
           </a:xfrm>
           <a:prstGeom prst="rect">
@@ -4787,7 +4929,7 @@
           <a:p>
             <a:pPr algn="ctr"/>
             <a:r>
-              <a:rPr lang="en-US" sz="1050" dirty="0"/>
+              <a:rPr lang="en-US" sz="1050" dirty="0" smtClean="0"/>
               <a:t>…Command</a:t>
             </a:r>
             <a:endParaRPr lang="en-SG" sz="1050" dirty="0"/>
@@ -4805,7 +4947,7 @@
         </p:nvCxnSpPr>
         <p:spPr>
           <a:xfrm>
-            <a:off x="3877683" y="1387919"/>
+            <a:off x="4354217" y="1659253"/>
             <a:ext cx="370183" cy="758167"/>
           </a:xfrm>
           <a:prstGeom prst="bentConnector3">
@@ -4843,7 +4985,7 @@
         </p:nvCxnSpPr>
         <p:spPr>
           <a:xfrm rot="5400000" flipH="1" flipV="1">
-            <a:off x="975695" y="1620107"/>
+            <a:off x="1452229" y="1891441"/>
             <a:ext cx="1427532" cy="801666"/>
           </a:xfrm>
           <a:prstGeom prst="bentConnector2">
@@ -4879,7 +5021,7 @@
         </p:nvCxnSpPr>
         <p:spPr>
           <a:xfrm rot="5400000" flipH="1" flipV="1">
-            <a:off x="155598" y="1541030"/>
+            <a:off x="632132" y="1812364"/>
             <a:ext cx="2293164" cy="1576229"/>
           </a:xfrm>
           <a:prstGeom prst="bentConnector3">
@@ -4920,7 +5062,7 @@
         </p:nvCxnSpPr>
         <p:spPr>
           <a:xfrm rot="5400000">
-            <a:off x="1318630" y="2519409"/>
+            <a:off x="1795164" y="2790743"/>
             <a:ext cx="1889726" cy="6348"/>
           </a:xfrm>
           <a:prstGeom prst="bentConnector3">
@@ -4961,7 +5103,7 @@
         </p:nvSpPr>
         <p:spPr>
           <a:xfrm flipH="1">
-            <a:off x="742666" y="448706"/>
+            <a:off x="1219200" y="720040"/>
             <a:ext cx="1404109" cy="346760"/>
           </a:xfrm>
           <a:prstGeom prst="rect">
@@ -5008,7 +5150,7 @@
         </p:nvCxnSpPr>
         <p:spPr>
           <a:xfrm rot="16200000" flipV="1">
-            <a:off x="2290118" y="478743"/>
+            <a:off x="2766652" y="750077"/>
             <a:ext cx="462768" cy="749453"/>
           </a:xfrm>
           <a:prstGeom prst="bentConnector2">
@@ -5049,7 +5191,7 @@
         </p:nvCxnSpPr>
         <p:spPr>
           <a:xfrm rot="5400000" flipH="1" flipV="1">
-            <a:off x="-870930" y="1862134"/>
+            <a:off x="-394396" y="2133468"/>
             <a:ext cx="2853643" cy="373549"/>
           </a:xfrm>
           <a:prstGeom prst="bentConnector2">
@@ -5080,17 +5222,62 @@
           </a:fontRef>
         </p:style>
       </p:cxnSp>
+      <p:sp>
+        <p:nvSpPr>
+          <p:cNvPr id="92" name="Rectangle 91"/>
+          <p:cNvSpPr/>
+          <p:nvPr/>
+        </p:nvSpPr>
+        <p:spPr>
+          <a:xfrm>
+            <a:off x="6781800" y="3539440"/>
+            <a:ext cx="929296" cy="346760"/>
+          </a:xfrm>
+          <a:prstGeom prst="rect">
+            <a:avLst/>
+          </a:prstGeom>
+          <a:ln w="19050"/>
+          <a:effectLst/>
+        </p:spPr>
+        <p:style>
+          <a:lnRef idx="1">
+            <a:schemeClr val="accent4"/>
+          </a:lnRef>
+          <a:fillRef idx="2">
+            <a:schemeClr val="accent4"/>
+          </a:fillRef>
+          <a:effectRef idx="1">
+            <a:schemeClr val="accent4"/>
+          </a:effectRef>
+          <a:fontRef idx="minor">
+            <a:schemeClr val="dk1"/>
+          </a:fontRef>
+        </p:style>
+        <p:txBody>
+          <a:bodyPr rtlCol="0" anchor="ctr"/>
+          <a:lstStyle/>
+          <a:p>
+            <a:pPr algn="ctr"/>
+            <a:r>
+              <a:rPr lang="en-US" sz="1050" dirty="0"/>
+              <a:t>Name</a:t>
+            </a:r>
+            <a:endParaRPr lang="en-SG" sz="1050" dirty="0"/>
+          </a:p>
+        </p:txBody>
+      </p:sp>
       <p:cxnSp>
         <p:nvCxnSpPr>
           <p:cNvPr id="93" name="Elbow Connector 92"/>
           <p:cNvCxnSpPr>
             <a:stCxn id="90" idx="3"/>
+            <a:endCxn id="92" idx="1"/>
           </p:cNvCxnSpPr>
           <p:nvPr/>
         </p:nvCxnSpPr>
         <p:spPr>
           <a:xfrm flipV="1">
-            <a:off x="5908268" y="3441486"/>
+            <a:off x="6384802" y="3712820"/>
             <a:ext cx="396998" cy="809271"/>
           </a:xfrm>
           <a:prstGeom prst="bentConnector3">
@@ -5127,7 +5314,7 @@
         </p:nvSpPr>
         <p:spPr>
           <a:xfrm>
-            <a:off x="5908268" y="602808"/>
+            <a:off x="6384802" y="874142"/>
             <a:ext cx="929296" cy="346760"/>
           </a:xfrm>
           <a:prstGeom prst="rect">
@@ -5156,7 +5343,7 @@
           <a:p>
             <a:pPr algn="ctr"/>
             <a:r>
-              <a:rPr lang="en-US" sz="1050" dirty="0"/>
+              <a:rPr lang="en-US" sz="1050" dirty="0" smtClean="0"/>
               <a:t>Messages</a:t>
             </a:r>
             <a:endParaRPr lang="en-SG" sz="1050" dirty="0"/>
@@ -5171,7 +5358,7 @@
         </p:nvSpPr>
         <p:spPr>
           <a:xfrm>
-            <a:off x="7115986" y="602808"/>
+            <a:off x="7592520" y="874142"/>
             <a:ext cx="929296" cy="346760"/>
           </a:xfrm>
           <a:prstGeom prst="rect">
@@ -5200,7 +5387,7 @@
           <a:p>
             <a:pPr algn="ctr"/>
             <a:r>
-              <a:rPr lang="en-US" sz="1050" dirty="0" err="1"/>
+              <a:rPr lang="en-US" sz="1050" dirty="0" err="1" smtClean="0"/>
               <a:t>Utils</a:t>
             </a:r>
             <a:endParaRPr lang="en-SG" sz="1050" dirty="0"/>
@@ -5215,7 +5402,7 @@
         </p:nvSpPr>
         <p:spPr>
           <a:xfrm>
-            <a:off x="3190342" y="3439163"/>
+            <a:off x="3666876" y="3710497"/>
             <a:ext cx="929296" cy="346760"/>
           </a:xfrm>
           <a:prstGeom prst="rect">
@@ -5259,7 +5446,7 @@
         </p:nvSpPr>
         <p:spPr>
           <a:xfrm>
-            <a:off x="1880229" y="4184306"/>
+            <a:off x="2356763" y="4455640"/>
             <a:ext cx="929296" cy="346760"/>
           </a:xfrm>
           <a:prstGeom prst="rect">
@@ -5288,7 +5475,7 @@
           <a:p>
             <a:pPr algn="ctr"/>
             <a:r>
-              <a:rPr lang="en-US" sz="1050" dirty="0"/>
+              <a:rPr lang="en-US" sz="1050" dirty="0" smtClean="0"/>
               <a:t>Adapted…</a:t>
             </a:r>
             <a:endParaRPr lang="en-SG" sz="1050" dirty="0"/>
@@ -5306,7 +5493,7 @@
         </p:nvCxnSpPr>
         <p:spPr>
           <a:xfrm flipV="1">
-            <a:off x="1605989" y="4357686"/>
+            <a:off x="2082523" y="4629020"/>
             <a:ext cx="274240" cy="4831"/>
           </a:xfrm>
           <a:prstGeom prst="bentConnector3">
@@ -5347,7 +5534,7 @@
         </p:nvCxnSpPr>
         <p:spPr>
           <a:xfrm flipV="1">
-            <a:off x="6213069" y="928111"/>
+            <a:off x="6689603" y="1199445"/>
             <a:ext cx="0" cy="304800"/>
           </a:xfrm>
           <a:prstGeom prst="straightConnector1">
@@ -5386,7 +5573,7 @@
         </p:nvCxnSpPr>
         <p:spPr>
           <a:xfrm flipV="1">
-            <a:off x="6365469" y="928111"/>
+            <a:off x="6842003" y="1199445"/>
             <a:ext cx="0" cy="304800"/>
           </a:xfrm>
           <a:prstGeom prst="straightConnector1">
@@ -5425,7 +5612,7 @@
         </p:nvCxnSpPr>
         <p:spPr>
           <a:xfrm flipV="1">
-            <a:off x="6517869" y="928111"/>
+            <a:off x="6994403" y="1199445"/>
             <a:ext cx="0" cy="304800"/>
           </a:xfrm>
           <a:prstGeom prst="straightConnector1">
@@ -5464,7 +5651,7 @@
         </p:nvCxnSpPr>
         <p:spPr>
           <a:xfrm flipV="1">
-            <a:off x="7387912" y="928111"/>
+            <a:off x="7864446" y="1199445"/>
             <a:ext cx="0" cy="304800"/>
           </a:xfrm>
           <a:prstGeom prst="straightConnector1">
@@ -5503,7 +5690,7 @@
         </p:nvCxnSpPr>
         <p:spPr>
           <a:xfrm flipV="1">
-            <a:off x="7540312" y="928111"/>
+            <a:off x="8016846" y="1199445"/>
             <a:ext cx="0" cy="304800"/>
           </a:xfrm>
           <a:prstGeom prst="straightConnector1">
@@ -5542,7 +5729,7 @@
         </p:nvCxnSpPr>
         <p:spPr>
           <a:xfrm flipV="1">
-            <a:off x="7692712" y="928111"/>
+            <a:off x="8169246" y="1199445"/>
             <a:ext cx="0" cy="304800"/>
           </a:xfrm>
           <a:prstGeom prst="straightConnector1">
@@ -5573,505 +5760,6 @@
           </a:fontRef>
         </p:style>
       </p:cxnSp>
-      <p:sp>
-        <p:nvSpPr>
-          <p:cNvPr id="116" name="Rectangle 6"/>
-          <p:cNvSpPr/>
-          <p:nvPr/>
-        </p:nvSpPr>
-        <p:spPr>
-          <a:xfrm>
-            <a:off x="7028079" y="5274670"/>
-            <a:ext cx="1868998" cy="327923"/>
-          </a:xfrm>
-          <a:prstGeom prst="rect">
-            <a:avLst/>
-          </a:prstGeom>
-          <a:ln w="19050"/>
-          <a:effectLst/>
-        </p:spPr>
-        <p:style>
-          <a:lnRef idx="1">
-            <a:schemeClr val="accent4"/>
-          </a:lnRef>
-          <a:fillRef idx="2">
-            <a:schemeClr val="accent4"/>
-          </a:fillRef>
-          <a:effectRef idx="1">
-            <a:schemeClr val="accent4"/>
-          </a:effectRef>
-          <a:fontRef idx="minor">
-            <a:schemeClr val="dk1"/>
-          </a:fontRef>
-        </p:style>
-        <p:txBody>
-          <a:bodyPr rtlCol="0" anchor="ctr"/>
-          <a:lstStyle/>
-          <a:p>
-            <a:pPr algn="ctr"/>
-            <a:r>
-              <a:rPr lang="en-SG" sz="1050" dirty="0"/>
-              <a:t>&lt;&lt;interface&gt;&gt; Printable</a:t>
-            </a:r>
-          </a:p>
-        </p:txBody>
-      </p:sp>
-      <p:sp>
-        <p:nvSpPr>
-          <p:cNvPr id="117" name="Rectangle 19"/>
-          <p:cNvSpPr/>
-          <p:nvPr/>
-        </p:nvSpPr>
-        <p:spPr>
-          <a:xfrm>
-            <a:off x="6324600" y="3747787"/>
-            <a:ext cx="929296" cy="346760"/>
-          </a:xfrm>
-          <a:prstGeom prst="rect">
-            <a:avLst/>
-          </a:prstGeom>
-          <a:ln w="19050"/>
-          <a:effectLst/>
-        </p:spPr>
-        <p:style>
-          <a:lnRef idx="1">
-            <a:schemeClr val="accent4"/>
-          </a:lnRef>
-          <a:fillRef idx="2">
-            <a:schemeClr val="accent4"/>
-          </a:fillRef>
-          <a:effectRef idx="1">
-            <a:schemeClr val="accent4"/>
-          </a:effectRef>
-          <a:fontRef idx="minor">
-            <a:schemeClr val="dk1"/>
-          </a:fontRef>
-        </p:style>
-        <p:txBody>
-          <a:bodyPr rtlCol="0" anchor="ctr"/>
-          <a:lstStyle/>
-          <a:p>
-            <a:pPr algn="ctr"/>
-            <a:r>
-              <a:rPr lang="en-US" sz="1050" dirty="0"/>
-              <a:t>Phone</a:t>
-            </a:r>
-            <a:endParaRPr lang="en-SG" sz="1050" dirty="0"/>
-          </a:p>
-        </p:txBody>
-      </p:sp>
-      <p:sp>
-        <p:nvSpPr>
-          <p:cNvPr id="119" name="Rectangle 20"/>
-          <p:cNvSpPr/>
-          <p:nvPr/>
-        </p:nvSpPr>
-        <p:spPr>
-          <a:xfrm>
-            <a:off x="6324600" y="4142774"/>
-            <a:ext cx="929296" cy="346760"/>
-          </a:xfrm>
-          <a:prstGeom prst="rect">
-            <a:avLst/>
-          </a:prstGeom>
-          <a:ln w="19050"/>
-          <a:effectLst/>
-        </p:spPr>
-        <p:style>
-          <a:lnRef idx="1">
-            <a:schemeClr val="accent4"/>
-          </a:lnRef>
-          <a:fillRef idx="2">
-            <a:schemeClr val="accent4"/>
-          </a:fillRef>
-          <a:effectRef idx="1">
-            <a:schemeClr val="accent4"/>
-          </a:effectRef>
-          <a:fontRef idx="minor">
-            <a:schemeClr val="dk1"/>
-          </a:fontRef>
-        </p:style>
-        <p:txBody>
-          <a:bodyPr rtlCol="0" anchor="ctr"/>
-          <a:lstStyle/>
-          <a:p>
-            <a:pPr algn="ctr"/>
-            <a:r>
-              <a:rPr lang="en-US" sz="1050" dirty="0"/>
-              <a:t>Email</a:t>
-            </a:r>
-            <a:endParaRPr lang="en-SG" sz="1050" dirty="0"/>
-          </a:p>
-        </p:txBody>
-      </p:sp>
-      <p:sp>
-        <p:nvSpPr>
-          <p:cNvPr id="120" name="Rectangle 21"/>
-          <p:cNvSpPr/>
-          <p:nvPr/>
-        </p:nvSpPr>
-        <p:spPr>
-          <a:xfrm>
-            <a:off x="6324600" y="4537760"/>
-            <a:ext cx="929296" cy="346760"/>
-          </a:xfrm>
-          <a:prstGeom prst="rect">
-            <a:avLst/>
-          </a:prstGeom>
-          <a:ln w="19050"/>
-          <a:effectLst/>
-        </p:spPr>
-        <p:style>
-          <a:lnRef idx="1">
-            <a:schemeClr val="accent4"/>
-          </a:lnRef>
-          <a:fillRef idx="2">
-            <a:schemeClr val="accent4"/>
-          </a:fillRef>
-          <a:effectRef idx="1">
-            <a:schemeClr val="accent4"/>
-          </a:effectRef>
-          <a:fontRef idx="minor">
-            <a:schemeClr val="dk1"/>
-          </a:fontRef>
-        </p:style>
-        <p:txBody>
-          <a:bodyPr rtlCol="0" anchor="ctr"/>
-          <a:lstStyle/>
-          <a:p>
-            <a:pPr algn="ctr"/>
-            <a:r>
-              <a:rPr lang="en-US" sz="1050" dirty="0"/>
-              <a:t>Address</a:t>
-            </a:r>
-            <a:endParaRPr lang="en-SG" sz="1050" dirty="0"/>
-          </a:p>
-        </p:txBody>
-      </p:sp>
-      <p:sp>
-        <p:nvSpPr>
-          <p:cNvPr id="121" name="Isosceles Triangle 24"/>
-          <p:cNvSpPr/>
-          <p:nvPr/>
-        </p:nvSpPr>
-        <p:spPr>
-          <a:xfrm rot="10800000">
-            <a:off x="7827326" y="5089944"/>
-            <a:ext cx="270504" cy="175523"/>
-          </a:xfrm>
-          <a:prstGeom prst="triangle">
-            <a:avLst/>
-          </a:prstGeom>
-          <a:ln w="19050"/>
-          <a:effectLst/>
-        </p:spPr>
-        <p:style>
-          <a:lnRef idx="1">
-            <a:schemeClr val="accent4"/>
-          </a:lnRef>
-          <a:fillRef idx="2">
-            <a:schemeClr val="accent4"/>
-          </a:fillRef>
-          <a:effectRef idx="1">
-            <a:schemeClr val="accent4"/>
-          </a:effectRef>
-          <a:fontRef idx="minor">
-            <a:schemeClr val="dk1"/>
-          </a:fontRef>
-        </p:style>
-        <p:txBody>
-          <a:bodyPr rtlCol="0" anchor="ctr"/>
-          <a:lstStyle/>
-          <a:p>
-            <a:pPr algn="ctr"/>
-            <a:endParaRPr lang="en-SG" sz="1050"/>
-          </a:p>
-        </p:txBody>
-      </p:sp>
-      <p:cxnSp>
-        <p:nvCxnSpPr>
-          <p:cNvPr id="122" name="Elbow Connector 25"/>
-          <p:cNvCxnSpPr>
-            <a:stCxn id="121" idx="3"/>
-            <a:endCxn id="119" idx="3"/>
-          </p:cNvCxnSpPr>
-          <p:nvPr/>
-        </p:nvCxnSpPr>
-        <p:spPr>
-          <a:xfrm rot="16200000" flipV="1">
-            <a:off x="7221342" y="4348708"/>
-            <a:ext cx="773790" cy="708682"/>
-          </a:xfrm>
-          <a:prstGeom prst="bentConnector2">
-            <a:avLst/>
-          </a:prstGeom>
-          <a:ln w="19050">
-            <a:prstDash val="dash"/>
-          </a:ln>
-          <a:effectLst/>
-        </p:spPr>
-        <p:style>
-          <a:lnRef idx="1">
-            <a:schemeClr val="accent4"/>
-          </a:lnRef>
-          <a:fillRef idx="2">
-            <a:schemeClr val="accent4"/>
-          </a:fillRef>
-          <a:effectRef idx="1">
-            <a:schemeClr val="accent4"/>
-          </a:effectRef>
-          <a:fontRef idx="minor">
-            <a:schemeClr val="dk1"/>
-          </a:fontRef>
-        </p:style>
-      </p:cxnSp>
-      <p:cxnSp>
-        <p:nvCxnSpPr>
-          <p:cNvPr id="123" name="Elbow Connector 26"/>
-          <p:cNvCxnSpPr>
-            <a:stCxn id="121" idx="3"/>
-            <a:endCxn id="117" idx="3"/>
-          </p:cNvCxnSpPr>
-          <p:nvPr/>
-        </p:nvCxnSpPr>
-        <p:spPr>
-          <a:xfrm rot="16200000" flipV="1">
-            <a:off x="7023849" y="4151215"/>
-            <a:ext cx="1168777" cy="708682"/>
-          </a:xfrm>
-          <a:prstGeom prst="bentConnector2">
-            <a:avLst/>
-          </a:prstGeom>
-          <a:ln w="19050">
-            <a:prstDash val="dash"/>
-          </a:ln>
-          <a:effectLst/>
-        </p:spPr>
-        <p:style>
-          <a:lnRef idx="1">
-            <a:schemeClr val="accent4"/>
-          </a:lnRef>
-          <a:fillRef idx="2">
-            <a:schemeClr val="accent4"/>
-          </a:fillRef>
-          <a:effectRef idx="1">
-            <a:schemeClr val="accent4"/>
-          </a:effectRef>
-          <a:fontRef idx="minor">
-            <a:schemeClr val="dk1"/>
-          </a:fontRef>
-        </p:style>
-      </p:cxnSp>
-      <p:cxnSp>
-        <p:nvCxnSpPr>
-          <p:cNvPr id="124" name="Elbow Connector 29"/>
-          <p:cNvCxnSpPr>
-            <a:stCxn id="121" idx="3"/>
-            <a:endCxn id="120" idx="3"/>
-          </p:cNvCxnSpPr>
-          <p:nvPr/>
-        </p:nvCxnSpPr>
-        <p:spPr>
-          <a:xfrm rot="16200000" flipV="1">
-            <a:off x="7418835" y="4546201"/>
-            <a:ext cx="378804" cy="708682"/>
-          </a:xfrm>
-          <a:prstGeom prst="bentConnector2">
-            <a:avLst/>
-          </a:prstGeom>
-          <a:ln w="19050">
-            <a:prstDash val="dash"/>
-          </a:ln>
-          <a:effectLst/>
-        </p:spPr>
-        <p:style>
-          <a:lnRef idx="1">
-            <a:schemeClr val="accent4"/>
-          </a:lnRef>
-          <a:fillRef idx="2">
-            <a:schemeClr val="accent4"/>
-          </a:fillRef>
-          <a:effectRef idx="1">
-            <a:schemeClr val="accent4"/>
-          </a:effectRef>
-          <a:fontRef idx="minor">
-            <a:schemeClr val="dk1"/>
-          </a:fontRef>
-        </p:style>
-      </p:cxnSp>
-      <p:sp>
-        <p:nvSpPr>
-          <p:cNvPr id="125" name="Rectangle 21"/>
-          <p:cNvSpPr/>
-          <p:nvPr/>
-        </p:nvSpPr>
-        <p:spPr>
-          <a:xfrm>
-            <a:off x="6324600" y="3352800"/>
-            <a:ext cx="929296" cy="346760"/>
-          </a:xfrm>
-          <a:prstGeom prst="rect">
-            <a:avLst/>
-          </a:prstGeom>
-          <a:ln w="19050"/>
-          <a:effectLst/>
-        </p:spPr>
-        <p:style>
-          <a:lnRef idx="1">
-            <a:schemeClr val="accent4"/>
-          </a:lnRef>
-          <a:fillRef idx="2">
-            <a:schemeClr val="accent4"/>
-          </a:fillRef>
-          <a:effectRef idx="1">
-            <a:schemeClr val="accent4"/>
-          </a:effectRef>
-          <a:fontRef idx="minor">
-            <a:schemeClr val="dk1"/>
-          </a:fontRef>
-        </p:style>
-        <p:txBody>
-          <a:bodyPr rtlCol="0" anchor="ctr"/>
-          <a:lstStyle/>
-          <a:p>
-            <a:pPr algn="ctr"/>
-            <a:r>
-              <a:rPr lang="en-US" sz="1050" dirty="0"/>
-              <a:t>Name</a:t>
-            </a:r>
-            <a:endParaRPr lang="en-SG" sz="1050" dirty="0"/>
-          </a:p>
-        </p:txBody>
-      </p:sp>
-      <p:cxnSp>
-        <p:nvCxnSpPr>
-          <p:cNvPr id="126" name="Elbow Connector 26"/>
-          <p:cNvCxnSpPr>
-            <a:stCxn id="121" idx="3"/>
-            <a:endCxn id="125" idx="3"/>
-          </p:cNvCxnSpPr>
-          <p:nvPr/>
-        </p:nvCxnSpPr>
-        <p:spPr>
-          <a:xfrm rot="16200000" flipV="1">
-            <a:off x="6826355" y="3953721"/>
-            <a:ext cx="1563764" cy="708682"/>
-          </a:xfrm>
-          <a:prstGeom prst="bentConnector2">
-            <a:avLst/>
-          </a:prstGeom>
-          <a:ln w="19050">
-            <a:prstDash val="dash"/>
-          </a:ln>
-          <a:effectLst/>
-        </p:spPr>
-        <p:style>
-          <a:lnRef idx="1">
-            <a:schemeClr val="accent4"/>
-          </a:lnRef>
-          <a:fillRef idx="2">
-            <a:schemeClr val="accent4"/>
-          </a:fillRef>
-          <a:effectRef idx="1">
-            <a:schemeClr val="accent4"/>
-          </a:effectRef>
-          <a:fontRef idx="minor">
-            <a:schemeClr val="dk1"/>
-          </a:fontRef>
-        </p:style>
-      </p:cxnSp>
-      <p:sp>
-        <p:nvSpPr>
-          <p:cNvPr id="127" name="Rectangle 6"/>
-          <p:cNvSpPr/>
-          <p:nvPr/>
-        </p:nvSpPr>
-        <p:spPr>
-          <a:xfrm>
-            <a:off x="7028079" y="5602495"/>
-            <a:ext cx="1868998" cy="122745"/>
-          </a:xfrm>
-          <a:prstGeom prst="rect">
-            <a:avLst/>
-          </a:prstGeom>
-          <a:ln w="19050"/>
-          <a:effectLst/>
-        </p:spPr>
-        <p:style>
-          <a:lnRef idx="1">
-            <a:schemeClr val="accent4"/>
-          </a:lnRef>
-          <a:fillRef idx="2">
-            <a:schemeClr val="accent4"/>
-          </a:fillRef>
-          <a:effectRef idx="1">
-            <a:schemeClr val="accent4"/>
-          </a:effectRef>
-          <a:fontRef idx="minor">
-            <a:schemeClr val="dk1"/>
-          </a:fontRef>
-        </p:style>
-        <p:txBody>
-          <a:bodyPr rtlCol="0" anchor="ctr"/>
-          <a:lstStyle/>
-          <a:p>
-            <a:pPr algn="ctr"/>
-            <a:endParaRPr lang="en-SG" sz="1050" dirty="0"/>
-          </a:p>
-        </p:txBody>
-      </p:sp>
-      <p:sp>
-        <p:nvSpPr>
-          <p:cNvPr id="128" name="Rectangle 6"/>
-          <p:cNvSpPr/>
-          <p:nvPr/>
-        </p:nvSpPr>
-        <p:spPr>
-          <a:xfrm>
-            <a:off x="7028079" y="5720887"/>
-            <a:ext cx="1868998" cy="271943"/>
-          </a:xfrm>
-          <a:prstGeom prst="rect">
-            <a:avLst/>
-          </a:prstGeom>
-          <a:ln w="19050"/>
-          <a:effectLst/>
-        </p:spPr>
-        <p:style>
-          <a:lnRef idx="1">
-            <a:schemeClr val="accent4"/>
-          </a:lnRef>
-          <a:fillRef idx="2">
-            <a:schemeClr val="accent4"/>
-          </a:fillRef>
-          <a:effectRef idx="1">
-            <a:schemeClr val="accent4"/>
-          </a:effectRef>
-          <a:fontRef idx="minor">
-            <a:schemeClr val="dk1"/>
-          </a:fontRef>
-        </p:style>
-        <p:txBody>
-          <a:bodyPr rtlCol="0" anchor="ctr"/>
-          <a:lstStyle/>
-          <a:p>
-            <a:pPr algn="ctr"/>
-            <a:r>
-              <a:rPr lang="en-US" sz="1050" dirty="0"/>
-              <a:t>+ </a:t>
-            </a:r>
-            <a:r>
-              <a:rPr lang="en-US" sz="1050" dirty="0" err="1"/>
-              <a:t>getPrintableString</a:t>
-            </a:r>
-            <a:r>
-              <a:rPr lang="en-US" sz="1050" dirty="0"/>
-              <a:t>(): String</a:t>
-            </a:r>
-            <a:endParaRPr lang="en-SG" sz="1050" dirty="0"/>
-          </a:p>
-        </p:txBody>
-      </p:sp>
     </p:spTree>
     <p:extLst>
       <p:ext uri="{BB962C8B-B14F-4D97-AF65-F5344CB8AC3E}">
@@ -6139,7 +5827,7 @@
           <a:p>
             <a:pPr algn="ctr"/>
             <a:r>
-              <a:rPr lang="en-US" sz="1050" dirty="0"/>
+              <a:rPr lang="en-US" sz="1050" dirty="0" smtClean="0"/>
               <a:t>Address</a:t>
             </a:r>
             <a:endParaRPr lang="en-SG" sz="1050" dirty="0"/>
@@ -6183,7 +5871,7 @@
           <a:p>
             <a:pPr algn="ctr"/>
             <a:r>
-              <a:rPr lang="en-US" sz="1050" dirty="0"/>
+              <a:rPr lang="en-US" sz="1050" dirty="0" smtClean="0"/>
               <a:t>Unit</a:t>
             </a:r>
             <a:endParaRPr lang="en-SG" sz="1050" dirty="0"/>
@@ -6310,7 +5998,7 @@
           <a:p>
             <a:pPr algn="ctr"/>
             <a:r>
-              <a:rPr lang="en-US" sz="1050" dirty="0"/>
+              <a:rPr lang="en-US" sz="1050" dirty="0" smtClean="0"/>
               <a:t>Postal code</a:t>
             </a:r>
             <a:endParaRPr lang="en-SG" sz="1050" dirty="0"/>
@@ -6354,7 +6042,7 @@
           <a:p>
             <a:pPr algn="ctr"/>
             <a:r>
-              <a:rPr lang="en-US" sz="1050" dirty="0"/>
+              <a:rPr lang="en-US" sz="1050" dirty="0" smtClean="0"/>
               <a:t>Street</a:t>
             </a:r>
             <a:endParaRPr lang="en-SG" sz="1050" dirty="0"/>
@@ -6398,7 +6086,7 @@
           <a:p>
             <a:pPr algn="ctr"/>
             <a:r>
-              <a:rPr lang="en-US" sz="1050" dirty="0"/>
+              <a:rPr lang="en-US" sz="1050" dirty="0" smtClean="0"/>
               <a:t>Block</a:t>
             </a:r>
             <a:endParaRPr lang="en-SG" sz="1050" dirty="0"/>
@@ -6562,9 +6250,10 @@
           <a:p>
             <a:pPr algn="ctr"/>
             <a:r>
-              <a:rPr lang="en-SG" sz="1050" dirty="0"/>
+              <a:rPr lang="en-SG" sz="1050" dirty="0" smtClean="0"/>
               <a:t>Contact</a:t>
             </a:r>
+            <a:endParaRPr lang="en-SG" sz="1050" dirty="0"/>
           </a:p>
         </p:txBody>
       </p:sp>
@@ -6605,7 +6294,7 @@
           <a:p>
             <a:pPr algn="ctr"/>
             <a:r>
-              <a:rPr lang="en-US" sz="1050" dirty="0"/>
+              <a:rPr lang="en-US" sz="1050" dirty="0" smtClean="0"/>
               <a:t>Phone</a:t>
             </a:r>
             <a:endParaRPr lang="en-SG" sz="1050" dirty="0"/>
@@ -6649,7 +6338,7 @@
           <a:p>
             <a:pPr algn="ctr"/>
             <a:r>
-              <a:rPr lang="en-US" sz="1050" dirty="0"/>
+              <a:rPr lang="en-US" sz="1050" dirty="0" smtClean="0"/>
               <a:t>Email</a:t>
             </a:r>
             <a:endParaRPr lang="en-SG" sz="1050" dirty="0"/>
@@ -6693,7 +6382,7 @@
           <a:p>
             <a:pPr algn="ctr"/>
             <a:r>
-              <a:rPr lang="en-US" sz="1050" dirty="0"/>
+              <a:rPr lang="en-US" sz="1050" dirty="0" smtClean="0"/>
               <a:t>Address</a:t>
             </a:r>
             <a:endParaRPr lang="en-SG" sz="1050" dirty="0"/>
@@ -6882,9 +6571,10 @@
           <a:p>
             <a:pPr algn="ctr"/>
             <a:r>
-              <a:rPr lang="en-SG" sz="1050" dirty="0"/>
+              <a:rPr lang="en-SG" sz="1050" dirty="0" smtClean="0"/>
               <a:t>&lt;&lt;interface&gt;&gt; Printable</a:t>
             </a:r>
+            <a:endParaRPr lang="en-SG" sz="1050" dirty="0"/>
           </a:p>
         </p:txBody>
       </p:sp>
@@ -6925,7 +6615,7 @@
           <a:p>
             <a:pPr algn="ctr"/>
             <a:r>
-              <a:rPr lang="en-US" sz="1050" dirty="0"/>
+              <a:rPr lang="en-US" sz="1050" dirty="0" smtClean="0"/>
               <a:t>Phone</a:t>
             </a:r>
             <a:endParaRPr lang="en-SG" sz="1050" dirty="0"/>
@@ -6969,7 +6659,7 @@
           <a:p>
             <a:pPr algn="ctr"/>
             <a:r>
-              <a:rPr lang="en-US" sz="1050" dirty="0"/>
+              <a:rPr lang="en-US" sz="1050" dirty="0" smtClean="0"/>
               <a:t>Email</a:t>
             </a:r>
             <a:endParaRPr lang="en-SG" sz="1050" dirty="0"/>
@@ -7013,7 +6703,7 @@
           <a:p>
             <a:pPr algn="ctr"/>
             <a:r>
-              <a:rPr lang="en-US" sz="1050" dirty="0"/>
+              <a:rPr lang="en-US" sz="1050" dirty="0" smtClean="0"/>
               <a:t>Address</a:t>
             </a:r>
             <a:endParaRPr lang="en-SG" sz="1050" dirty="0"/>
@@ -7214,7 +6904,7 @@
           <a:p>
             <a:pPr algn="ctr"/>
             <a:r>
-              <a:rPr lang="en-US" sz="1050" dirty="0"/>
+              <a:rPr lang="en-US" sz="1050" dirty="0" smtClean="0"/>
               <a:t>Name</a:t>
             </a:r>
             <a:endParaRPr lang="en-SG" sz="1050" dirty="0"/>
@@ -7337,15 +7027,15 @@
           <a:p>
             <a:pPr algn="ctr"/>
             <a:r>
-              <a:rPr lang="en-US" sz="1050" dirty="0"/>
+              <a:rPr lang="en-US" sz="1050" dirty="0" smtClean="0"/>
               <a:t>+ </a:t>
             </a:r>
             <a:r>
-              <a:rPr lang="en-US" sz="1050" dirty="0" err="1"/>
+              <a:rPr lang="en-US" sz="1050" dirty="0" err="1" smtClean="0"/>
               <a:t>getPrintableString</a:t>
             </a:r>
             <a:r>
-              <a:rPr lang="en-US" sz="1050" dirty="0"/>
+              <a:rPr lang="en-US" sz="1050" dirty="0" smtClean="0"/>
               <a:t>(): String</a:t>
             </a:r>
             <a:endParaRPr lang="en-SG" sz="1050" dirty="0"/>
@@ -7433,14 +7123,14 @@
           <a:p>
             <a:pPr algn="ctr"/>
             <a:r>
-              <a:rPr lang="en-US" sz="1050" dirty="0"/>
+              <a:rPr lang="en-US" sz="1050" dirty="0" smtClean="0"/>
               <a:t>Unique</a:t>
             </a:r>
             <a:br>
-              <a:rPr lang="en-US" sz="1050" dirty="0"/>
+              <a:rPr lang="en-US" sz="1050" dirty="0" smtClean="0"/>
             </a:br>
             <a:r>
-              <a:rPr lang="en-US" sz="1050" dirty="0" err="1"/>
+              <a:rPr lang="en-US" sz="1050" dirty="0" err="1" smtClean="0"/>
               <a:t>TagList</a:t>
             </a:r>
             <a:endParaRPr lang="en-SG" sz="1050" dirty="0"/>
@@ -7484,14 +7174,14 @@
           <a:p>
             <a:pPr algn="ctr"/>
             <a:r>
-              <a:rPr lang="en-US" sz="1050" dirty="0"/>
+              <a:rPr lang="en-US" sz="1050" dirty="0" smtClean="0"/>
               <a:t>Unique</a:t>
             </a:r>
             <a:br>
-              <a:rPr lang="en-US" sz="1050" dirty="0"/>
+              <a:rPr lang="en-US" sz="1050" dirty="0" smtClean="0"/>
             </a:br>
             <a:r>
-              <a:rPr lang="en-US" sz="1050" dirty="0" err="1"/>
+              <a:rPr lang="en-US" sz="1050" dirty="0" err="1" smtClean="0"/>
               <a:t>PersonList</a:t>
             </a:r>
             <a:endParaRPr lang="en-SG" sz="1050" dirty="0"/>
@@ -7535,7 +7225,7 @@
           <a:p>
             <a:pPr algn="ctr"/>
             <a:r>
-              <a:rPr lang="en-US" sz="1050" dirty="0"/>
+              <a:rPr lang="en-US" sz="1050" dirty="0" smtClean="0"/>
               <a:t>Person</a:t>
             </a:r>
             <a:endParaRPr lang="en-SG" sz="1050" dirty="0"/>
@@ -7902,7 +7592,7 @@
           <a:p>
             <a:pPr algn="ctr"/>
             <a:r>
-              <a:rPr lang="en-US" sz="1050" dirty="0"/>
+              <a:rPr lang="en-US" sz="1050" dirty="0" smtClean="0"/>
               <a:t>Tagging</a:t>
             </a:r>
             <a:endParaRPr lang="en-SG" sz="1050" dirty="0"/>
@@ -8046,7 +7736,7 @@
           <a:lstStyle/>
           <a:p>
             <a:r>
-              <a:rPr lang="en-US" dirty="0">
+              <a:rPr lang="en-US" dirty="0" smtClean="0">
                 <a:solidFill>
                   <a:schemeClr val="accent6">
                     <a:lumMod val="75000"/>
@@ -8055,6 +7745,13 @@
               </a:rPr>
               <a:t>*</a:t>
             </a:r>
+            <a:endParaRPr lang="en-US" dirty="0">
+              <a:solidFill>
+                <a:schemeClr val="accent6">
+                  <a:lumMod val="75000"/>
+                </a:schemeClr>
+              </a:solidFill>
+            </a:endParaRPr>
           </a:p>
         </p:txBody>
       </p:sp>

</xml_diff>